<commit_message>
additions to word and presentation docs
</commit_message>
<xml_diff>
--- a/ExtraStuff/FinalPresentation.pptx
+++ b/ExtraStuff/FinalPresentation.pptx
@@ -7,6 +7,11 @@
   <p:sldIdLst>
     <p:sldId id="256" r:id="rId2"/>
     <p:sldId id="257" r:id="rId3"/>
+    <p:sldId id="258" r:id="rId4"/>
+    <p:sldId id="259" r:id="rId5"/>
+    <p:sldId id="260" r:id="rId6"/>
+    <p:sldId id="261" r:id="rId7"/>
+    <p:sldId id="262" r:id="rId8"/>
   </p:sldIdLst>
   <p:sldSz cx="12192000" cy="6858000"/>
   <p:notesSz cx="6858000" cy="9144000"/>
@@ -105,6 +110,11 @@
       </a:defRPr>
     </a:lvl9pPr>
   </p:defaultTextStyle>
+  <p:extLst>
+    <p:ext uri="{EFAFB233-063F-42B5-8137-9DF3F51BA10A}">
+      <p15:sldGuideLst xmlns:p15="http://schemas.microsoft.com/office/powerpoint/2012/main"/>
+    </p:ext>
+  </p:extLst>
 </p:presentation>
 </file>
 
@@ -3864,6 +3874,14 @@
 <file path=ppt/slides/slide2.xml><?xml version="1.0" encoding="utf-8"?>
 <p:sld xmlns:a="http://schemas.openxmlformats.org/drawingml/2006/main" xmlns:r="http://schemas.openxmlformats.org/officeDocument/2006/relationships" xmlns:p="http://schemas.openxmlformats.org/presentationml/2006/main">
   <p:cSld>
+    <p:bg>
+      <p:bgPr>
+        <a:solidFill>
+          <a:schemeClr val="bg2"/>
+        </a:solidFill>
+        <a:effectLst/>
+      </p:bgPr>
+    </p:bg>
     <p:spTree>
       <p:nvGrpSpPr>
         <p:cNvPr id="1" name=""/>
@@ -3878,6 +3896,66 @@
           <a:chExt cx="0" cy="0"/>
         </a:xfrm>
       </p:grpSpPr>
+      <p:sp useBgFill="1">
+        <p:nvSpPr>
+          <p:cNvPr id="137" name="Rectangle 136">
+            <a:extLst>
+              <a:ext uri="{FF2B5EF4-FFF2-40B4-BE49-F238E27FC236}">
+                <a16:creationId xmlns:a16="http://schemas.microsoft.com/office/drawing/2014/main" id="{6EFADEDC-47BB-4F2C-AB69-715527B4D596}"/>
+              </a:ext>
+              <a:ext uri="{C183D7F6-B498-43B3-948B-1728B52AA6E4}">
+                <adec:decorative xmlns:adec="http://schemas.microsoft.com/office/drawing/2017/decorative" val="1"/>
+              </a:ext>
+            </a:extLst>
+          </p:cNvPr>
+          <p:cNvSpPr>
+            <a:spLocks noGrp="1" noRot="1" noChangeAspect="1" noMove="1" noResize="1" noEditPoints="1" noAdjustHandles="1" noChangeArrowheads="1" noChangeShapeType="1" noTextEdit="1"/>
+          </p:cNvSpPr>
+          <p:nvPr>
+            <p:extLst>
+              <p:ext uri="{386F3935-93C4-4BCD-93E2-E3B085C9AB24}">
+                <p16:designElem xmlns:p16="http://schemas.microsoft.com/office/powerpoint/2015/main" val="1"/>
+              </p:ext>
+            </p:extLst>
+          </p:nvPr>
+        </p:nvSpPr>
+        <p:spPr>
+          <a:xfrm>
+            <a:off x="0" y="0"/>
+            <a:ext cx="12192000" cy="6858000"/>
+          </a:xfrm>
+          <a:prstGeom prst="rect">
+            <a:avLst/>
+          </a:prstGeom>
+          <a:ln>
+            <a:noFill/>
+          </a:ln>
+        </p:spPr>
+        <p:style>
+          <a:lnRef idx="2">
+            <a:schemeClr val="accent1">
+              <a:shade val="50000"/>
+            </a:schemeClr>
+          </a:lnRef>
+          <a:fillRef idx="1">
+            <a:schemeClr val="accent1"/>
+          </a:fillRef>
+          <a:effectRef idx="0">
+            <a:schemeClr val="accent1"/>
+          </a:effectRef>
+          <a:fontRef idx="minor">
+            <a:schemeClr val="lt1"/>
+          </a:fontRef>
+        </p:style>
+        <p:txBody>
+          <a:bodyPr rtlCol="0" anchor="ctr"/>
+          <a:lstStyle/>
+          <a:p>
+            <a:pPr algn="ctr"/>
+            <a:endParaRPr lang="en-US"/>
+          </a:p>
+        </p:txBody>
+      </p:sp>
       <p:sp>
         <p:nvSpPr>
           <p:cNvPr id="2" name="Title 1">
@@ -3894,14 +3972,179 @@
             <p:ph type="title"/>
           </p:nvPr>
         </p:nvSpPr>
-        <p:spPr/>
-        <p:txBody>
-          <a:bodyPr/>
+        <p:spPr>
+          <a:xfrm>
+            <a:off x="5100824" y="685800"/>
+            <a:ext cx="6176776" cy="1485900"/>
+          </a:xfrm>
+        </p:spPr>
+        <p:txBody>
+          <a:bodyPr>
+            <a:normAutofit/>
+          </a:bodyPr>
           <a:lstStyle/>
           <a:p>
-            <a:endParaRPr lang="en-US"/>
-          </a:p>
-        </p:txBody>
+            <a:r>
+              <a:rPr lang="en-US"/>
+              <a:t>Purpose:</a:t>
+            </a:r>
+          </a:p>
+        </p:txBody>
+      </p:sp>
+      <p:pic>
+        <p:nvPicPr>
+          <p:cNvPr id="1026" name="Picture 2" descr="Image result for funny street view">
+            <a:extLst>
+              <a:ext uri="{FF2B5EF4-FFF2-40B4-BE49-F238E27FC236}">
+                <a16:creationId xmlns:a16="http://schemas.microsoft.com/office/drawing/2014/main" id="{2A6020EF-297B-474A-AB6E-659EFB26F3EC}"/>
+              </a:ext>
+            </a:extLst>
+          </p:cNvPr>
+          <p:cNvPicPr>
+            <a:picLocks noChangeAspect="1" noChangeArrowheads="1"/>
+          </p:cNvPicPr>
+          <p:nvPr/>
+        </p:nvPicPr>
+        <p:blipFill>
+          <a:blip r:embed="rId2">
+            <a:extLst>
+              <a:ext uri="{28A0092B-C50C-407E-A947-70E740481C1C}">
+                <a14:useLocalDpi xmlns:a14="http://schemas.microsoft.com/office/drawing/2010/main" val="0"/>
+              </a:ext>
+            </a:extLst>
+          </a:blip>
+          <a:stretch>
+            <a:fillRect/>
+          </a:stretch>
+        </p:blipFill>
+        <p:spPr bwMode="auto">
+          <a:xfrm>
+            <a:off x="321733" y="671839"/>
+            <a:ext cx="3730079" cy="2648356"/>
+          </a:xfrm>
+          <a:prstGeom prst="rect">
+            <a:avLst/>
+          </a:prstGeom>
+          <a:noFill/>
+          <a:ln>
+            <a:noFill/>
+          </a:ln>
+          <a:effectLst/>
+          <a:extLst>
+            <a:ext uri="{909E8E84-426E-40DD-AFC4-6F175D3DCCD1}">
+              <a14:hiddenFill xmlns:a14="http://schemas.microsoft.com/office/drawing/2010/main">
+                <a:solidFill>
+                  <a:srgbClr val="FFFFFF"/>
+                </a:solidFill>
+              </a14:hiddenFill>
+            </a:ext>
+          </a:extLst>
+        </p:spPr>
+      </p:pic>
+      <p:pic>
+        <p:nvPicPr>
+          <p:cNvPr id="1028" name="Picture 4" descr="Image result for mnist">
+            <a:extLst>
+              <a:ext uri="{FF2B5EF4-FFF2-40B4-BE49-F238E27FC236}">
+                <a16:creationId xmlns:a16="http://schemas.microsoft.com/office/drawing/2014/main" id="{96989296-CB8F-4A09-8F16-AB3C0EA2D5DA}"/>
+              </a:ext>
+            </a:extLst>
+          </p:cNvPr>
+          <p:cNvPicPr>
+            <a:picLocks noChangeAspect="1" noChangeArrowheads="1"/>
+          </p:cNvPicPr>
+          <p:nvPr/>
+        </p:nvPicPr>
+        <p:blipFill>
+          <a:blip r:embed="rId3">
+            <a:extLst>
+              <a:ext uri="{28A0092B-C50C-407E-A947-70E740481C1C}">
+                <a14:useLocalDpi xmlns:a14="http://schemas.microsoft.com/office/drawing/2010/main" val="0"/>
+              </a:ext>
+            </a:extLst>
+          </a:blip>
+          <a:stretch>
+            <a:fillRect/>
+          </a:stretch>
+        </p:blipFill>
+        <p:spPr bwMode="auto">
+          <a:xfrm>
+            <a:off x="321733" y="4004066"/>
+            <a:ext cx="3730079" cy="1715836"/>
+          </a:xfrm>
+          <a:prstGeom prst="rect">
+            <a:avLst/>
+          </a:prstGeom>
+          <a:noFill/>
+          <a:ln>
+            <a:noFill/>
+          </a:ln>
+          <a:effectLst/>
+          <a:extLst>
+            <a:ext uri="{909E8E84-426E-40DD-AFC4-6F175D3DCCD1}">
+              <a14:hiddenFill xmlns:a14="http://schemas.microsoft.com/office/drawing/2010/main">
+                <a:solidFill>
+                  <a:srgbClr val="FFFFFF"/>
+                </a:solidFill>
+              </a14:hiddenFill>
+            </a:ext>
+          </a:extLst>
+        </p:spPr>
+      </p:pic>
+      <p:sp>
+        <p:nvSpPr>
+          <p:cNvPr id="139" name="Rectangle 138">
+            <a:extLst>
+              <a:ext uri="{FF2B5EF4-FFF2-40B4-BE49-F238E27FC236}">
+                <a16:creationId xmlns:a16="http://schemas.microsoft.com/office/drawing/2014/main" id="{CC97F718-8333-4ACB-AEE4-87F88BE1D410}"/>
+              </a:ext>
+              <a:ext uri="{C183D7F6-B498-43B3-948B-1728B52AA6E4}">
+                <adec:decorative xmlns:adec="http://schemas.microsoft.com/office/drawing/2017/decorative" val="1"/>
+              </a:ext>
+            </a:extLst>
+          </p:cNvPr>
+          <p:cNvSpPr>
+            <a:spLocks noGrp="1" noRot="1" noChangeAspect="1" noMove="1" noResize="1" noEditPoints="1" noAdjustHandles="1" noChangeArrowheads="1" noChangeShapeType="1" noTextEdit="1"/>
+          </p:cNvSpPr>
+          <p:nvPr>
+            <p:extLst>
+              <p:ext uri="{386F3935-93C4-4BCD-93E2-E3B085C9AB24}">
+                <p16:designElem xmlns:p16="http://schemas.microsoft.com/office/powerpoint/2015/main" val="1"/>
+              </p:ext>
+            </p:extLst>
+          </p:nvPr>
+        </p:nvSpPr>
+        <p:spPr>
+          <a:xfrm>
+            <a:off x="4373545" y="376"/>
+            <a:ext cx="228600" cy="6858000"/>
+          </a:xfrm>
+          <a:prstGeom prst="rect">
+            <a:avLst/>
+          </a:prstGeom>
+          <a:solidFill>
+            <a:schemeClr val="tx2"/>
+          </a:solidFill>
+          <a:ln>
+            <a:noFill/>
+          </a:ln>
+        </p:spPr>
+        <p:style>
+          <a:lnRef idx="2">
+            <a:schemeClr val="accent1">
+              <a:shade val="50000"/>
+            </a:schemeClr>
+          </a:lnRef>
+          <a:fillRef idx="1">
+            <a:schemeClr val="accent1"/>
+          </a:fillRef>
+          <a:effectRef idx="0">
+            <a:schemeClr val="accent1"/>
+          </a:effectRef>
+          <a:fontRef idx="minor">
+            <a:schemeClr val="lt1"/>
+          </a:fontRef>
+        </p:style>
       </p:sp>
       <p:sp>
         <p:nvSpPr>
@@ -3919,12 +4162,63 @@
             <p:ph idx="1"/>
           </p:nvPr>
         </p:nvSpPr>
-        <p:spPr/>
-        <p:txBody>
-          <a:bodyPr/>
+        <p:spPr>
+          <a:xfrm>
+            <a:off x="5100824" y="2286000"/>
+            <a:ext cx="6176776" cy="3581400"/>
+          </a:xfrm>
+        </p:spPr>
+        <p:txBody>
+          <a:bodyPr>
+            <a:normAutofit/>
+          </a:bodyPr>
           <a:lstStyle/>
           <a:p>
-            <a:endParaRPr lang="en-US"/>
+            <a:r>
+              <a:rPr lang="en-US" dirty="0"/>
+              <a:t>CNN </a:t>
+            </a:r>
+            <a:r>
+              <a:rPr lang="en-US" dirty="0" err="1"/>
+              <a:t>Streetview</a:t>
+            </a:r>
+            <a:r>
+              <a:rPr lang="en-US" dirty="0"/>
+              <a:t> to MNIST</a:t>
+            </a:r>
+          </a:p>
+          <a:p>
+            <a:pPr lvl="1"/>
+            <a:r>
+              <a:rPr lang="en-US" dirty="0"/>
+              <a:t>How versatile is a CNN?</a:t>
+            </a:r>
+          </a:p>
+          <a:p>
+            <a:pPr lvl="1"/>
+            <a:endParaRPr lang="en-US" dirty="0"/>
+          </a:p>
+          <a:p>
+            <a:pPr lvl="1"/>
+            <a:r>
+              <a:rPr lang="en-US" dirty="0"/>
+              <a:t>Train it on </a:t>
+            </a:r>
+            <a:r>
+              <a:rPr lang="en-US" dirty="0" err="1"/>
+              <a:t>streetview</a:t>
+            </a:r>
+            <a:r>
+              <a:rPr lang="en-US" dirty="0"/>
+              <a:t> digits</a:t>
+            </a:r>
+          </a:p>
+          <a:p>
+            <a:pPr lvl="1"/>
+            <a:r>
+              <a:rPr lang="en-US" dirty="0"/>
+              <a:t>Test it on MNIST</a:t>
+            </a:r>
           </a:p>
         </p:txBody>
       </p:sp>
@@ -3932,6 +4226,703 @@
     <p:extLst>
       <p:ext uri="{BB962C8B-B14F-4D97-AF65-F5344CB8AC3E}">
         <p14:creationId xmlns:p14="http://schemas.microsoft.com/office/powerpoint/2010/main" val="3140129174"/>
+      </p:ext>
+    </p:extLst>
+  </p:cSld>
+  <p:clrMapOvr>
+    <a:overrideClrMapping bg1="dk1" tx1="lt1" bg2="dk2" tx2="lt2" accent1="accent1" accent2="accent2" accent3="accent3" accent4="accent4" accent5="accent5" accent6="accent6" hlink="hlink" folHlink="folHlink"/>
+  </p:clrMapOvr>
+</p:sld>
+</file>
+
+<file path=ppt/slides/slide3.xml><?xml version="1.0" encoding="utf-8"?>
+<p:sld xmlns:a="http://schemas.openxmlformats.org/drawingml/2006/main" xmlns:r="http://schemas.openxmlformats.org/officeDocument/2006/relationships" xmlns:p="http://schemas.openxmlformats.org/presentationml/2006/main">
+  <p:cSld>
+    <p:bg>
+      <p:bgPr>
+        <a:solidFill>
+          <a:schemeClr val="bg2"/>
+        </a:solidFill>
+        <a:effectLst/>
+      </p:bgPr>
+    </p:bg>
+    <p:spTree>
+      <p:nvGrpSpPr>
+        <p:cNvPr id="1" name=""/>
+        <p:cNvGrpSpPr/>
+        <p:nvPr/>
+      </p:nvGrpSpPr>
+      <p:grpSpPr>
+        <a:xfrm>
+          <a:off x="0" y="0"/>
+          <a:ext cx="0" cy="0"/>
+          <a:chOff x="0" y="0"/>
+          <a:chExt cx="0" cy="0"/>
+        </a:xfrm>
+      </p:grpSpPr>
+      <p:pic>
+        <p:nvPicPr>
+          <p:cNvPr id="2053" name="Picture 2" descr="Image result for surprise cat meme">
+            <a:extLst>
+              <a:ext uri="{FF2B5EF4-FFF2-40B4-BE49-F238E27FC236}">
+                <a16:creationId xmlns:a16="http://schemas.microsoft.com/office/drawing/2014/main" id="{1936E49F-4495-4F33-AF5D-C35B2045CFE1}"/>
+              </a:ext>
+            </a:extLst>
+          </p:cNvPr>
+          <p:cNvPicPr>
+            <a:picLocks noChangeAspect="1" noChangeArrowheads="1"/>
+          </p:cNvPicPr>
+          <p:nvPr/>
+        </p:nvPicPr>
+        <p:blipFill rotWithShape="1">
+          <a:blip r:embed="rId2">
+            <a:extLst>
+              <a:ext uri="{28A0092B-C50C-407E-A947-70E740481C1C}">
+                <a14:useLocalDpi xmlns:a14="http://schemas.microsoft.com/office/drawing/2010/main" val="0"/>
+              </a:ext>
+            </a:extLst>
+          </a:blip>
+          <a:srcRect t="11617" r="1" b="13112"/>
+          <a:stretch/>
+        </p:blipFill>
+        <p:spPr bwMode="auto">
+          <a:xfrm>
+            <a:off x="-1" y="10"/>
+            <a:ext cx="12188652" cy="6857990"/>
+          </a:xfrm>
+          <a:prstGeom prst="rect">
+            <a:avLst/>
+          </a:prstGeom>
+          <a:noFill/>
+          <a:extLst>
+            <a:ext uri="{909E8E84-426E-40DD-AFC4-6F175D3DCCD1}">
+              <a14:hiddenFill xmlns:a14="http://schemas.microsoft.com/office/drawing/2010/main">
+                <a:solidFill>
+                  <a:srgbClr val="FFFFFF"/>
+                </a:solidFill>
+              </a14:hiddenFill>
+            </a:ext>
+          </a:extLst>
+        </p:spPr>
+      </p:pic>
+      <p:sp>
+        <p:nvSpPr>
+          <p:cNvPr id="74" name="Rectangle 73">
+            <a:extLst>
+              <a:ext uri="{FF2B5EF4-FFF2-40B4-BE49-F238E27FC236}">
+                <a16:creationId xmlns:a16="http://schemas.microsoft.com/office/drawing/2014/main" id="{2078F889-8780-48D5-8B9E-DF8B13063783}"/>
+              </a:ext>
+              <a:ext uri="{C183D7F6-B498-43B3-948B-1728B52AA6E4}">
+                <adec:decorative xmlns:adec="http://schemas.microsoft.com/office/drawing/2017/decorative" val="1"/>
+              </a:ext>
+            </a:extLst>
+          </p:cNvPr>
+          <p:cNvSpPr>
+            <a:spLocks noGrp="1" noRot="1" noChangeAspect="1" noMove="1" noResize="1" noEditPoints="1" noAdjustHandles="1" noChangeArrowheads="1" noChangeShapeType="1" noTextEdit="1"/>
+          </p:cNvSpPr>
+          <p:nvPr>
+            <p:extLst>
+              <p:ext uri="{386F3935-93C4-4BCD-93E2-E3B085C9AB24}">
+                <p16:designElem xmlns:p16="http://schemas.microsoft.com/office/powerpoint/2015/main" val="1"/>
+              </p:ext>
+            </p:extLst>
+          </p:nvPr>
+        </p:nvSpPr>
+        <p:spPr bwMode="ltGray">
+          <a:xfrm>
+            <a:off x="-258" y="0"/>
+            <a:ext cx="12192000" cy="6858000"/>
+          </a:xfrm>
+          <a:prstGeom prst="rect">
+            <a:avLst/>
+          </a:prstGeom>
+          <a:gradFill flip="none" rotWithShape="1">
+            <a:gsLst>
+              <a:gs pos="20000">
+                <a:schemeClr val="tx2">
+                  <a:alpha val="70000"/>
+                </a:schemeClr>
+              </a:gs>
+              <a:gs pos="100000">
+                <a:schemeClr val="tx2"/>
+              </a:gs>
+            </a:gsLst>
+            <a:path path="circle">
+              <a:fillToRect l="50000" t="50000" r="50000" b="50000"/>
+            </a:path>
+            <a:tileRect/>
+          </a:gradFill>
+          <a:ln>
+            <a:noFill/>
+          </a:ln>
+        </p:spPr>
+        <p:style>
+          <a:lnRef idx="2">
+            <a:schemeClr val="accent1">
+              <a:shade val="50000"/>
+            </a:schemeClr>
+          </a:lnRef>
+          <a:fillRef idx="1">
+            <a:schemeClr val="accent1"/>
+          </a:fillRef>
+          <a:effectRef idx="0">
+            <a:schemeClr val="accent1"/>
+          </a:effectRef>
+          <a:fontRef idx="minor">
+            <a:schemeClr val="lt1"/>
+          </a:fontRef>
+        </p:style>
+        <p:txBody>
+          <a:bodyPr rtlCol="0" anchor="ctr"/>
+          <a:lstStyle/>
+          <a:p>
+            <a:pPr algn="ctr"/>
+            <a:endParaRPr lang="en-US"/>
+          </a:p>
+        </p:txBody>
+      </p:sp>
+      <p:sp>
+        <p:nvSpPr>
+          <p:cNvPr id="2" name="Title 1">
+            <a:extLst>
+              <a:ext uri="{FF2B5EF4-FFF2-40B4-BE49-F238E27FC236}">
+                <a16:creationId xmlns:a16="http://schemas.microsoft.com/office/drawing/2014/main" id="{9087ECBA-7721-48DF-861B-6295A4236997}"/>
+              </a:ext>
+            </a:extLst>
+          </p:cNvPr>
+          <p:cNvSpPr>
+            <a:spLocks noGrp="1"/>
+          </p:cNvSpPr>
+          <p:nvPr>
+            <p:ph type="title"/>
+          </p:nvPr>
+        </p:nvSpPr>
+        <p:spPr>
+          <a:xfrm>
+            <a:off x="1371600" y="685800"/>
+            <a:ext cx="9601200" cy="1485900"/>
+          </a:xfrm>
+        </p:spPr>
+        <p:txBody>
+          <a:bodyPr>
+            <a:normAutofit/>
+          </a:bodyPr>
+          <a:lstStyle/>
+          <a:p>
+            <a:r>
+              <a:rPr lang="en-US">
+                <a:solidFill>
+                  <a:schemeClr val="bg2"/>
+                </a:solidFill>
+              </a:rPr>
+              <a:t>Challenges:</a:t>
+            </a:r>
+          </a:p>
+        </p:txBody>
+      </p:sp>
+      <p:sp>
+        <p:nvSpPr>
+          <p:cNvPr id="76" name="Rectangle 75">
+            <a:extLst>
+              <a:ext uri="{FF2B5EF4-FFF2-40B4-BE49-F238E27FC236}">
+                <a16:creationId xmlns:a16="http://schemas.microsoft.com/office/drawing/2014/main" id="{3A4CABA2-22A0-44B2-BD92-28FF73FCEA27}"/>
+              </a:ext>
+              <a:ext uri="{C183D7F6-B498-43B3-948B-1728B52AA6E4}">
+                <adec:decorative xmlns:adec="http://schemas.microsoft.com/office/drawing/2017/decorative" val="1"/>
+              </a:ext>
+            </a:extLst>
+          </p:cNvPr>
+          <p:cNvSpPr>
+            <a:spLocks noGrp="1" noRot="1" noChangeAspect="1" noMove="1" noResize="1" noEditPoints="1" noAdjustHandles="1" noChangeArrowheads="1" noChangeShapeType="1" noTextEdit="1"/>
+          </p:cNvSpPr>
+          <p:nvPr>
+            <p:extLst>
+              <p:ext uri="{386F3935-93C4-4BCD-93E2-E3B085C9AB24}">
+                <p16:designElem xmlns:p16="http://schemas.microsoft.com/office/powerpoint/2015/main" val="1"/>
+              </p:ext>
+            </p:extLst>
+          </p:nvPr>
+        </p:nvSpPr>
+        <p:spPr>
+          <a:xfrm>
+            <a:off x="478095" y="376"/>
+            <a:ext cx="228600" cy="6858000"/>
+          </a:xfrm>
+          <a:prstGeom prst="rect">
+            <a:avLst/>
+          </a:prstGeom>
+          <a:solidFill>
+            <a:schemeClr val="bg2"/>
+          </a:solidFill>
+          <a:ln>
+            <a:noFill/>
+          </a:ln>
+        </p:spPr>
+        <p:style>
+          <a:lnRef idx="2">
+            <a:schemeClr val="accent1">
+              <a:shade val="50000"/>
+            </a:schemeClr>
+          </a:lnRef>
+          <a:fillRef idx="1">
+            <a:schemeClr val="accent1"/>
+          </a:fillRef>
+          <a:effectRef idx="0">
+            <a:schemeClr val="accent1"/>
+          </a:effectRef>
+          <a:fontRef idx="minor">
+            <a:schemeClr val="lt1"/>
+          </a:fontRef>
+        </p:style>
+      </p:sp>
+      <p:sp>
+        <p:nvSpPr>
+          <p:cNvPr id="2055" name="Content Placeholder 2054">
+            <a:extLst>
+              <a:ext uri="{FF2B5EF4-FFF2-40B4-BE49-F238E27FC236}">
+                <a16:creationId xmlns:a16="http://schemas.microsoft.com/office/drawing/2014/main" id="{CA190B19-9BD9-4C60-B98A-FE4F1EA89223}"/>
+              </a:ext>
+            </a:extLst>
+          </p:cNvPr>
+          <p:cNvSpPr>
+            <a:spLocks noGrp="1"/>
+          </p:cNvSpPr>
+          <p:nvPr>
+            <p:ph idx="1"/>
+          </p:nvPr>
+        </p:nvSpPr>
+        <p:spPr>
+          <a:xfrm>
+            <a:off x="1371600" y="2286000"/>
+            <a:ext cx="9601200" cy="3581400"/>
+          </a:xfrm>
+        </p:spPr>
+        <p:txBody>
+          <a:bodyPr>
+            <a:normAutofit/>
+          </a:bodyPr>
+          <a:lstStyle/>
+          <a:p>
+            <a:r>
+              <a:rPr lang="en-US" dirty="0" err="1">
+                <a:solidFill>
+                  <a:schemeClr val="bg2"/>
+                </a:solidFill>
+              </a:rPr>
+              <a:t>Streetview</a:t>
+            </a:r>
+            <a:r>
+              <a:rPr lang="en-US" dirty="0">
+                <a:solidFill>
+                  <a:schemeClr val="bg2"/>
+                </a:solidFill>
+              </a:rPr>
+              <a:t> Data is Noisy</a:t>
+            </a:r>
+          </a:p>
+          <a:p>
+            <a:pPr lvl="1"/>
+            <a:r>
+              <a:rPr lang="en-US" dirty="0">
+                <a:solidFill>
+                  <a:schemeClr val="bg2"/>
+                </a:solidFill>
+              </a:rPr>
+              <a:t>Distracting digits</a:t>
+            </a:r>
+          </a:p>
+          <a:p>
+            <a:pPr lvl="1"/>
+            <a:r>
+              <a:rPr lang="en-US" dirty="0">
+                <a:solidFill>
+                  <a:schemeClr val="bg2"/>
+                </a:solidFill>
+              </a:rPr>
+              <a:t>Lighting</a:t>
+            </a:r>
+          </a:p>
+          <a:p>
+            <a:pPr lvl="1"/>
+            <a:r>
+              <a:rPr lang="en-US" dirty="0">
+                <a:solidFill>
+                  <a:schemeClr val="bg2"/>
+                </a:solidFill>
+              </a:rPr>
+              <a:t>Angles</a:t>
+            </a:r>
+          </a:p>
+          <a:p>
+            <a:pPr lvl="1"/>
+            <a:r>
+              <a:rPr lang="en-US" dirty="0">
+                <a:solidFill>
+                  <a:schemeClr val="bg2"/>
+                </a:solidFill>
+              </a:rPr>
+              <a:t>Colors</a:t>
+            </a:r>
+          </a:p>
+          <a:p>
+            <a:pPr lvl="1"/>
+            <a:r>
+              <a:rPr lang="en-US" dirty="0">
+                <a:solidFill>
+                  <a:schemeClr val="bg2"/>
+                </a:solidFill>
+              </a:rPr>
+              <a:t>“perfect digits” vs “imperfect handwriting”</a:t>
+            </a:r>
+          </a:p>
+          <a:p>
+            <a:pPr marL="530352" lvl="1" indent="0">
+              <a:buNone/>
+            </a:pPr>
+            <a:endParaRPr lang="en-US" dirty="0">
+              <a:solidFill>
+                <a:schemeClr val="bg2"/>
+              </a:solidFill>
+            </a:endParaRPr>
+          </a:p>
+        </p:txBody>
+      </p:sp>
+    </p:spTree>
+    <p:extLst>
+      <p:ext uri="{BB962C8B-B14F-4D97-AF65-F5344CB8AC3E}">
+        <p14:creationId xmlns:p14="http://schemas.microsoft.com/office/powerpoint/2010/main" val="962184113"/>
+      </p:ext>
+    </p:extLst>
+  </p:cSld>
+  <p:clrMapOvr>
+    <a:masterClrMapping/>
+  </p:clrMapOvr>
+</p:sld>
+</file>
+
+<file path=ppt/slides/slide4.xml><?xml version="1.0" encoding="utf-8"?>
+<p:sld xmlns:a="http://schemas.openxmlformats.org/drawingml/2006/main" xmlns:r="http://schemas.openxmlformats.org/officeDocument/2006/relationships" xmlns:p="http://schemas.openxmlformats.org/presentationml/2006/main">
+  <p:cSld>
+    <p:spTree>
+      <p:nvGrpSpPr>
+        <p:cNvPr id="1" name=""/>
+        <p:cNvGrpSpPr/>
+        <p:nvPr/>
+      </p:nvGrpSpPr>
+      <p:grpSpPr>
+        <a:xfrm>
+          <a:off x="0" y="0"/>
+          <a:ext cx="0" cy="0"/>
+          <a:chOff x="0" y="0"/>
+          <a:chExt cx="0" cy="0"/>
+        </a:xfrm>
+      </p:grpSpPr>
+      <p:sp>
+        <p:nvSpPr>
+          <p:cNvPr id="2" name="Title 1">
+            <a:extLst>
+              <a:ext uri="{FF2B5EF4-FFF2-40B4-BE49-F238E27FC236}">
+                <a16:creationId xmlns:a16="http://schemas.microsoft.com/office/drawing/2014/main" id="{AD015FAA-F29E-4C98-86F6-9C533A2B1AF2}"/>
+              </a:ext>
+            </a:extLst>
+          </p:cNvPr>
+          <p:cNvSpPr>
+            <a:spLocks noGrp="1"/>
+          </p:cNvSpPr>
+          <p:nvPr>
+            <p:ph type="title"/>
+          </p:nvPr>
+        </p:nvSpPr>
+        <p:spPr/>
+        <p:txBody>
+          <a:bodyPr/>
+          <a:lstStyle/>
+          <a:p>
+            <a:r>
+              <a:rPr lang="en-US" dirty="0"/>
+              <a:t>Plan of Attack:</a:t>
+            </a:r>
+          </a:p>
+        </p:txBody>
+      </p:sp>
+      <p:sp>
+        <p:nvSpPr>
+          <p:cNvPr id="3" name="Content Placeholder 2">
+            <a:extLst>
+              <a:ext uri="{FF2B5EF4-FFF2-40B4-BE49-F238E27FC236}">
+                <a16:creationId xmlns:a16="http://schemas.microsoft.com/office/drawing/2014/main" id="{35B5284A-F933-4452-B241-8CC86837840E}"/>
+              </a:ext>
+            </a:extLst>
+          </p:cNvPr>
+          <p:cNvSpPr>
+            <a:spLocks noGrp="1"/>
+          </p:cNvSpPr>
+          <p:nvPr>
+            <p:ph idx="1"/>
+          </p:nvPr>
+        </p:nvSpPr>
+        <p:spPr/>
+        <p:txBody>
+          <a:bodyPr/>
+          <a:lstStyle/>
+          <a:p>
+            <a:endParaRPr lang="en-US" dirty="0"/>
+          </a:p>
+        </p:txBody>
+      </p:sp>
+    </p:spTree>
+    <p:extLst>
+      <p:ext uri="{BB962C8B-B14F-4D97-AF65-F5344CB8AC3E}">
+        <p14:creationId xmlns:p14="http://schemas.microsoft.com/office/powerpoint/2010/main" val="3574465456"/>
+      </p:ext>
+    </p:extLst>
+  </p:cSld>
+  <p:clrMapOvr>
+    <a:masterClrMapping/>
+  </p:clrMapOvr>
+</p:sld>
+</file>
+
+<file path=ppt/slides/slide5.xml><?xml version="1.0" encoding="utf-8"?>
+<p:sld xmlns:a="http://schemas.openxmlformats.org/drawingml/2006/main" xmlns:r="http://schemas.openxmlformats.org/officeDocument/2006/relationships" xmlns:p="http://schemas.openxmlformats.org/presentationml/2006/main">
+  <p:cSld>
+    <p:spTree>
+      <p:nvGrpSpPr>
+        <p:cNvPr id="1" name=""/>
+        <p:cNvGrpSpPr/>
+        <p:nvPr/>
+      </p:nvGrpSpPr>
+      <p:grpSpPr>
+        <a:xfrm>
+          <a:off x="0" y="0"/>
+          <a:ext cx="0" cy="0"/>
+          <a:chOff x="0" y="0"/>
+          <a:chExt cx="0" cy="0"/>
+        </a:xfrm>
+      </p:grpSpPr>
+      <p:sp>
+        <p:nvSpPr>
+          <p:cNvPr id="2" name="Title 1">
+            <a:extLst>
+              <a:ext uri="{FF2B5EF4-FFF2-40B4-BE49-F238E27FC236}">
+                <a16:creationId xmlns:a16="http://schemas.microsoft.com/office/drawing/2014/main" id="{024FC0D1-C6F6-40EC-8997-DFF7B67C0DC2}"/>
+              </a:ext>
+            </a:extLst>
+          </p:cNvPr>
+          <p:cNvSpPr>
+            <a:spLocks noGrp="1"/>
+          </p:cNvSpPr>
+          <p:nvPr>
+            <p:ph type="title"/>
+          </p:nvPr>
+        </p:nvSpPr>
+        <p:spPr/>
+        <p:txBody>
+          <a:bodyPr/>
+          <a:lstStyle/>
+          <a:p>
+            <a:r>
+              <a:rPr lang="en-US" dirty="0"/>
+              <a:t>Model Overview:</a:t>
+            </a:r>
+          </a:p>
+        </p:txBody>
+      </p:sp>
+      <p:sp>
+        <p:nvSpPr>
+          <p:cNvPr id="3" name="Content Placeholder 2">
+            <a:extLst>
+              <a:ext uri="{FF2B5EF4-FFF2-40B4-BE49-F238E27FC236}">
+                <a16:creationId xmlns:a16="http://schemas.microsoft.com/office/drawing/2014/main" id="{6E8D681A-7213-41A4-8828-A0C695AE26A2}"/>
+              </a:ext>
+            </a:extLst>
+          </p:cNvPr>
+          <p:cNvSpPr>
+            <a:spLocks noGrp="1"/>
+          </p:cNvSpPr>
+          <p:nvPr>
+            <p:ph idx="1"/>
+          </p:nvPr>
+        </p:nvSpPr>
+        <p:spPr/>
+        <p:txBody>
+          <a:bodyPr/>
+          <a:lstStyle/>
+          <a:p>
+            <a:endParaRPr lang="en-US"/>
+          </a:p>
+        </p:txBody>
+      </p:sp>
+    </p:spTree>
+    <p:extLst>
+      <p:ext uri="{BB962C8B-B14F-4D97-AF65-F5344CB8AC3E}">
+        <p14:creationId xmlns:p14="http://schemas.microsoft.com/office/powerpoint/2010/main" val="2101147454"/>
+      </p:ext>
+    </p:extLst>
+  </p:cSld>
+  <p:clrMapOvr>
+    <a:masterClrMapping/>
+  </p:clrMapOvr>
+</p:sld>
+</file>
+
+<file path=ppt/slides/slide6.xml><?xml version="1.0" encoding="utf-8"?>
+<p:sld xmlns:a="http://schemas.openxmlformats.org/drawingml/2006/main" xmlns:r="http://schemas.openxmlformats.org/officeDocument/2006/relationships" xmlns:p="http://schemas.openxmlformats.org/presentationml/2006/main">
+  <p:cSld>
+    <p:spTree>
+      <p:nvGrpSpPr>
+        <p:cNvPr id="1" name=""/>
+        <p:cNvGrpSpPr/>
+        <p:nvPr/>
+      </p:nvGrpSpPr>
+      <p:grpSpPr>
+        <a:xfrm>
+          <a:off x="0" y="0"/>
+          <a:ext cx="0" cy="0"/>
+          <a:chOff x="0" y="0"/>
+          <a:chExt cx="0" cy="0"/>
+        </a:xfrm>
+      </p:grpSpPr>
+      <p:sp>
+        <p:nvSpPr>
+          <p:cNvPr id="2" name="Title 1">
+            <a:extLst>
+              <a:ext uri="{FF2B5EF4-FFF2-40B4-BE49-F238E27FC236}">
+                <a16:creationId xmlns:a16="http://schemas.microsoft.com/office/drawing/2014/main" id="{0E12C87E-AB4F-4B44-8294-87A43CEFF851}"/>
+              </a:ext>
+            </a:extLst>
+          </p:cNvPr>
+          <p:cNvSpPr>
+            <a:spLocks noGrp="1"/>
+          </p:cNvSpPr>
+          <p:nvPr>
+            <p:ph type="title"/>
+          </p:nvPr>
+        </p:nvSpPr>
+        <p:spPr/>
+        <p:txBody>
+          <a:bodyPr/>
+          <a:lstStyle/>
+          <a:p>
+            <a:r>
+              <a:rPr lang="en-US" dirty="0"/>
+              <a:t>Performance:</a:t>
+            </a:r>
+          </a:p>
+        </p:txBody>
+      </p:sp>
+      <p:sp>
+        <p:nvSpPr>
+          <p:cNvPr id="3" name="Content Placeholder 2">
+            <a:extLst>
+              <a:ext uri="{FF2B5EF4-FFF2-40B4-BE49-F238E27FC236}">
+                <a16:creationId xmlns:a16="http://schemas.microsoft.com/office/drawing/2014/main" id="{EF282908-9DBD-490B-9F3B-260FF1E91B54}"/>
+              </a:ext>
+            </a:extLst>
+          </p:cNvPr>
+          <p:cNvSpPr>
+            <a:spLocks noGrp="1"/>
+          </p:cNvSpPr>
+          <p:nvPr>
+            <p:ph idx="1"/>
+          </p:nvPr>
+        </p:nvSpPr>
+        <p:spPr/>
+        <p:txBody>
+          <a:bodyPr/>
+          <a:lstStyle/>
+          <a:p>
+            <a:endParaRPr lang="en-US"/>
+          </a:p>
+        </p:txBody>
+      </p:sp>
+    </p:spTree>
+    <p:extLst>
+      <p:ext uri="{BB962C8B-B14F-4D97-AF65-F5344CB8AC3E}">
+        <p14:creationId xmlns:p14="http://schemas.microsoft.com/office/powerpoint/2010/main" val="2508345309"/>
+      </p:ext>
+    </p:extLst>
+  </p:cSld>
+  <p:clrMapOvr>
+    <a:masterClrMapping/>
+  </p:clrMapOvr>
+</p:sld>
+</file>
+
+<file path=ppt/slides/slide7.xml><?xml version="1.0" encoding="utf-8"?>
+<p:sld xmlns:a="http://schemas.openxmlformats.org/drawingml/2006/main" xmlns:r="http://schemas.openxmlformats.org/officeDocument/2006/relationships" xmlns:p="http://schemas.openxmlformats.org/presentationml/2006/main">
+  <p:cSld>
+    <p:spTree>
+      <p:nvGrpSpPr>
+        <p:cNvPr id="1" name=""/>
+        <p:cNvGrpSpPr/>
+        <p:nvPr/>
+      </p:nvGrpSpPr>
+      <p:grpSpPr>
+        <a:xfrm>
+          <a:off x="0" y="0"/>
+          <a:ext cx="0" cy="0"/>
+          <a:chOff x="0" y="0"/>
+          <a:chExt cx="0" cy="0"/>
+        </a:xfrm>
+      </p:grpSpPr>
+      <p:sp>
+        <p:nvSpPr>
+          <p:cNvPr id="2" name="Title 1">
+            <a:extLst>
+              <a:ext uri="{FF2B5EF4-FFF2-40B4-BE49-F238E27FC236}">
+                <a16:creationId xmlns:a16="http://schemas.microsoft.com/office/drawing/2014/main" id="{26EA54CF-89F5-45FA-A3C0-00007C03B1C9}"/>
+              </a:ext>
+            </a:extLst>
+          </p:cNvPr>
+          <p:cNvSpPr>
+            <a:spLocks noGrp="1"/>
+          </p:cNvSpPr>
+          <p:nvPr>
+            <p:ph type="title"/>
+          </p:nvPr>
+        </p:nvSpPr>
+        <p:spPr/>
+        <p:txBody>
+          <a:bodyPr/>
+          <a:lstStyle/>
+          <a:p>
+            <a:r>
+              <a:rPr lang="en-US" dirty="0"/>
+              <a:t>Takeaways:</a:t>
+            </a:r>
+          </a:p>
+        </p:txBody>
+      </p:sp>
+      <p:sp>
+        <p:nvSpPr>
+          <p:cNvPr id="3" name="Content Placeholder 2">
+            <a:extLst>
+              <a:ext uri="{FF2B5EF4-FFF2-40B4-BE49-F238E27FC236}">
+                <a16:creationId xmlns:a16="http://schemas.microsoft.com/office/drawing/2014/main" id="{01D6C645-6202-437C-AA10-2BFFD004F076}"/>
+              </a:ext>
+            </a:extLst>
+          </p:cNvPr>
+          <p:cNvSpPr>
+            <a:spLocks noGrp="1"/>
+          </p:cNvSpPr>
+          <p:nvPr>
+            <p:ph idx="1"/>
+          </p:nvPr>
+        </p:nvSpPr>
+        <p:spPr/>
+        <p:txBody>
+          <a:bodyPr/>
+          <a:lstStyle/>
+          <a:p>
+            <a:endParaRPr lang="en-US"/>
+          </a:p>
+        </p:txBody>
+      </p:sp>
+    </p:spTree>
+    <p:extLst>
+      <p:ext uri="{BB962C8B-B14F-4D97-AF65-F5344CB8AC3E}">
+        <p14:creationId xmlns:p14="http://schemas.microsoft.com/office/powerpoint/2010/main" val="3962710087"/>
       </p:ext>
     </p:extLst>
   </p:cSld>

</xml_diff>

<commit_message>
finished report and presentation
</commit_message>
<xml_diff>
--- a/ExtraStuff/FinalPresentation.pptx
+++ b/ExtraStuff/FinalPresentation.pptx
@@ -10,11 +10,13 @@
     <p:sldId id="258" r:id="rId4"/>
     <p:sldId id="259" r:id="rId5"/>
     <p:sldId id="260" r:id="rId6"/>
-    <p:sldId id="261" r:id="rId7"/>
-    <p:sldId id="263" r:id="rId8"/>
-    <p:sldId id="264" r:id="rId9"/>
-    <p:sldId id="265" r:id="rId10"/>
-    <p:sldId id="262" r:id="rId11"/>
+    <p:sldId id="262" r:id="rId7"/>
+    <p:sldId id="261" r:id="rId8"/>
+    <p:sldId id="263" r:id="rId9"/>
+    <p:sldId id="264" r:id="rId10"/>
+    <p:sldId id="265" r:id="rId11"/>
+    <p:sldId id="266" r:id="rId12"/>
+    <p:sldId id="267" r:id="rId13"/>
   </p:sldIdLst>
   <p:sldSz cx="12192000" cy="6858000"/>
   <p:notesSz cx="6858000" cy="9144000"/>
@@ -291,7 +293,7 @@
             <a:fld id="{87DE6118-2437-4B30-8E3C-4D2BE6020583}" type="datetimeFigureOut">
               <a:rPr lang="en-US" dirty="0"/>
               <a:pPr/>
-              <a:t>5/15/2019</a:t>
+              <a:t>5/16/2019</a:t>
             </a:fld>
             <a:endParaRPr lang="en-US" dirty="0"/>
           </a:p>
@@ -617,7 +619,7 @@
           <a:p>
             <a:fld id="{87DE6118-2437-4B30-8E3C-4D2BE6020583}" type="datetimeFigureOut">
               <a:rPr lang="en-US" dirty="0"/>
-              <a:t>5/15/2019</a:t>
+              <a:t>5/16/2019</a:t>
             </a:fld>
             <a:endParaRPr lang="en-US" dirty="0"/>
           </a:p>
@@ -792,7 +794,7 @@
           <a:p>
             <a:fld id="{87DE6118-2437-4B30-8E3C-4D2BE6020583}" type="datetimeFigureOut">
               <a:rPr lang="en-US" dirty="0"/>
-              <a:t>5/15/2019</a:t>
+              <a:t>5/16/2019</a:t>
             </a:fld>
             <a:endParaRPr lang="en-US" dirty="0"/>
           </a:p>
@@ -957,7 +959,7 @@
           <a:p>
             <a:fld id="{87DE6118-2437-4B30-8E3C-4D2BE6020583}" type="datetimeFigureOut">
               <a:rPr lang="en-US" dirty="0"/>
-              <a:t>5/15/2019</a:t>
+              <a:t>5/16/2019</a:t>
             </a:fld>
             <a:endParaRPr lang="en-US" dirty="0"/>
           </a:p>
@@ -1230,7 +1232,7 @@
             <a:fld id="{87DE6118-2437-4B30-8E3C-4D2BE6020583}" type="datetimeFigureOut">
               <a:rPr lang="en-US" dirty="0"/>
               <a:pPr/>
-              <a:t>5/15/2019</a:t>
+              <a:t>5/16/2019</a:t>
             </a:fld>
             <a:endParaRPr lang="en-US" dirty="0"/>
           </a:p>
@@ -1620,7 +1622,7 @@
           <a:p>
             <a:fld id="{87DE6118-2437-4B30-8E3C-4D2BE6020583}" type="datetimeFigureOut">
               <a:rPr lang="en-US" dirty="0"/>
-              <a:t>5/15/2019</a:t>
+              <a:t>5/16/2019</a:t>
             </a:fld>
             <a:endParaRPr lang="en-US" dirty="0"/>
           </a:p>
@@ -2092,7 +2094,7 @@
           <a:p>
             <a:fld id="{87DE6118-2437-4B30-8E3C-4D2BE6020583}" type="datetimeFigureOut">
               <a:rPr lang="en-US" dirty="0"/>
-              <a:t>5/15/2019</a:t>
+              <a:t>5/16/2019</a:t>
             </a:fld>
             <a:endParaRPr lang="en-US" dirty="0"/>
           </a:p>
@@ -2205,7 +2207,7 @@
           <a:p>
             <a:fld id="{87DE6118-2437-4B30-8E3C-4D2BE6020583}" type="datetimeFigureOut">
               <a:rPr lang="en-US" dirty="0"/>
-              <a:t>5/15/2019</a:t>
+              <a:t>5/16/2019</a:t>
             </a:fld>
             <a:endParaRPr lang="en-US" dirty="0"/>
           </a:p>
@@ -2295,7 +2297,7 @@
           <a:p>
             <a:fld id="{87DE6118-2437-4B30-8E3C-4D2BE6020583}" type="datetimeFigureOut">
               <a:rPr lang="en-US" dirty="0"/>
-              <a:t>5/15/2019</a:t>
+              <a:t>5/16/2019</a:t>
             </a:fld>
             <a:endParaRPr lang="en-US" dirty="0"/>
           </a:p>
@@ -2637,7 +2639,7 @@
             <a:fld id="{87DE6118-2437-4B30-8E3C-4D2BE6020583}" type="datetimeFigureOut">
               <a:rPr lang="en-US" dirty="0"/>
               <a:pPr/>
-              <a:t>5/15/2019</a:t>
+              <a:t>5/16/2019</a:t>
             </a:fld>
             <a:endParaRPr lang="en-US" dirty="0"/>
           </a:p>
@@ -3022,7 +3024,7 @@
             <a:fld id="{87DE6118-2437-4B30-8E3C-4D2BE6020583}" type="datetimeFigureOut">
               <a:rPr lang="en-US" dirty="0"/>
               <a:pPr/>
-              <a:t>5/15/2019</a:t>
+              <a:t>5/16/2019</a:t>
             </a:fld>
             <a:endParaRPr lang="en-US" dirty="0"/>
           </a:p>
@@ -3297,7 +3299,7 @@
             <a:fld id="{87DE6118-2437-4B30-8E3C-4D2BE6020583}" type="datetimeFigureOut">
               <a:rPr lang="en-US" dirty="0"/>
               <a:pPr/>
-              <a:t>5/15/2019</a:t>
+              <a:t>5/16/2019</a:t>
             </a:fld>
             <a:endParaRPr lang="en-US" dirty="0"/>
           </a:p>
@@ -3877,6 +3879,14 @@
 <file path=ppt/slides/slide10.xml><?xml version="1.0" encoding="utf-8"?>
 <p:sld xmlns:a="http://schemas.openxmlformats.org/drawingml/2006/main" xmlns:r="http://schemas.openxmlformats.org/officeDocument/2006/relationships" xmlns:p="http://schemas.openxmlformats.org/presentationml/2006/main">
   <p:cSld>
+    <p:bg>
+      <p:bgPr>
+        <a:solidFill>
+          <a:schemeClr val="bg2"/>
+        </a:solidFill>
+        <a:effectLst/>
+      </p:bgPr>
+    </p:bg>
     <p:spTree>
       <p:nvGrpSpPr>
         <p:cNvPr id="1" name=""/>
@@ -3891,12 +3901,248 @@
           <a:chExt cx="0" cy="0"/>
         </a:xfrm>
       </p:grpSpPr>
+      <p:grpSp>
+        <p:nvGrpSpPr>
+          <p:cNvPr id="11" name="Group 10">
+            <a:extLst>
+              <a:ext uri="{FF2B5EF4-FFF2-40B4-BE49-F238E27FC236}">
+                <a16:creationId xmlns:a16="http://schemas.microsoft.com/office/drawing/2014/main" id="{57500303-A207-4812-BEB9-51E132FEB73F}"/>
+              </a:ext>
+              <a:ext uri="{C183D7F6-B498-43B3-948B-1728B52AA6E4}">
+                <adec:decorative xmlns:adec="http://schemas.microsoft.com/office/drawing/2017/decorative" val="1"/>
+              </a:ext>
+            </a:extLst>
+          </p:cNvPr>
+          <p:cNvGrpSpPr>
+            <a:grpSpLocks noGrp="1" noUngrp="1" noRot="1" noChangeAspect="1" noMove="1" noResize="1"/>
+          </p:cNvGrpSpPr>
+          <p:nvPr>
+            <p:extLst>
+              <p:ext uri="{386F3935-93C4-4BCD-93E2-E3B085C9AB24}">
+                <p16:designElem xmlns:p16="http://schemas.microsoft.com/office/powerpoint/2015/main" val="1"/>
+              </p:ext>
+            </p:extLst>
+          </p:nvPr>
+        </p:nvGrpSpPr>
+        <p:grpSpPr>
+          <a:xfrm>
+            <a:off x="752858" y="744469"/>
+            <a:ext cx="10674117" cy="5349671"/>
+            <a:chOff x="752858" y="744469"/>
+            <a:chExt cx="10674117" cy="5349671"/>
+          </a:xfrm>
+        </p:grpSpPr>
+        <p:sp>
+          <p:nvSpPr>
+            <p:cNvPr id="12" name="Freeform 6">
+              <a:extLst>
+                <a:ext uri="{FF2B5EF4-FFF2-40B4-BE49-F238E27FC236}">
+                  <a16:creationId xmlns:a16="http://schemas.microsoft.com/office/drawing/2014/main" id="{10118C91-C025-4776-BE95-E9926378E790}"/>
+                </a:ext>
+                <a:ext uri="{C183D7F6-B498-43B3-948B-1728B52AA6E4}">
+                  <adec:decorative xmlns:adec="http://schemas.microsoft.com/office/drawing/2017/decorative" val="1"/>
+                </a:ext>
+              </a:extLst>
+            </p:cNvPr>
+            <p:cNvSpPr/>
+            <p:nvPr>
+              <p:extLst>
+                <p:ext uri="{386F3935-93C4-4BCD-93E2-E3B085C9AB24}">
+                  <p16:designElem xmlns:p16="http://schemas.microsoft.com/office/powerpoint/2015/main" val="1"/>
+                </p:ext>
+              </p:extLst>
+            </p:nvPr>
+          </p:nvSpPr>
+          <p:spPr bwMode="auto">
+            <a:xfrm>
+              <a:off x="8151962" y="1685652"/>
+              <a:ext cx="3275013" cy="4408488"/>
+            </a:xfrm>
+            <a:custGeom>
+              <a:avLst/>
+              <a:gdLst/>
+              <a:ahLst/>
+              <a:cxnLst/>
+              <a:rect l="l" t="t" r="r" b="b"/>
+              <a:pathLst>
+                <a:path w="10000" h="10000">
+                  <a:moveTo>
+                    <a:pt x="8761" y="0"/>
+                  </a:moveTo>
+                  <a:lnTo>
+                    <a:pt x="10000" y="0"/>
+                  </a:lnTo>
+                  <a:lnTo>
+                    <a:pt x="10000" y="10000"/>
+                  </a:lnTo>
+                  <a:lnTo>
+                    <a:pt x="0" y="10000"/>
+                  </a:lnTo>
+                  <a:lnTo>
+                    <a:pt x="0" y="9126"/>
+                  </a:lnTo>
+                  <a:lnTo>
+                    <a:pt x="8761" y="9127"/>
+                  </a:lnTo>
+                  <a:lnTo>
+                    <a:pt x="8761" y="0"/>
+                  </a:lnTo>
+                  <a:close/>
+                </a:path>
+              </a:pathLst>
+            </a:custGeom>
+            <a:solidFill>
+              <a:schemeClr val="tx2"/>
+            </a:solidFill>
+            <a:ln w="0">
+              <a:noFill/>
+              <a:prstDash val="solid"/>
+              <a:round/>
+              <a:headEnd/>
+              <a:tailEnd/>
+            </a:ln>
+          </p:spPr>
+        </p:sp>
+        <p:sp>
+          <p:nvSpPr>
+            <p:cNvPr id="13" name="Freeform 6">
+              <a:extLst>
+                <a:ext uri="{FF2B5EF4-FFF2-40B4-BE49-F238E27FC236}">
+                  <a16:creationId xmlns:a16="http://schemas.microsoft.com/office/drawing/2014/main" id="{339174D0-30E8-4BBF-BF81-5DDAC33C0C0E}"/>
+                </a:ext>
+                <a:ext uri="{C183D7F6-B498-43B3-948B-1728B52AA6E4}">
+                  <adec:decorative xmlns:adec="http://schemas.microsoft.com/office/drawing/2017/decorative" val="1"/>
+                </a:ext>
+              </a:extLst>
+            </p:cNvPr>
+            <p:cNvSpPr/>
+            <p:nvPr>
+              <p:extLst>
+                <p:ext uri="{386F3935-93C4-4BCD-93E2-E3B085C9AB24}">
+                  <p16:designElem xmlns:p16="http://schemas.microsoft.com/office/powerpoint/2015/main" val="1"/>
+                </p:ext>
+              </p:extLst>
+            </p:nvPr>
+          </p:nvSpPr>
+          <p:spPr bwMode="auto">
+            <a:xfrm flipH="1" flipV="1">
+              <a:off x="752858" y="744469"/>
+              <a:ext cx="3275668" cy="4408488"/>
+            </a:xfrm>
+            <a:custGeom>
+              <a:avLst/>
+              <a:gdLst/>
+              <a:ahLst/>
+              <a:cxnLst/>
+              <a:rect l="l" t="t" r="r" b="b"/>
+              <a:pathLst>
+                <a:path w="10002" h="10000">
+                  <a:moveTo>
+                    <a:pt x="8763" y="0"/>
+                  </a:moveTo>
+                  <a:lnTo>
+                    <a:pt x="10002" y="0"/>
+                  </a:lnTo>
+                  <a:lnTo>
+                    <a:pt x="10002" y="10000"/>
+                  </a:lnTo>
+                  <a:lnTo>
+                    <a:pt x="2" y="10000"/>
+                  </a:lnTo>
+                  <a:cubicBezTo>
+                    <a:pt x="-2" y="9698"/>
+                    <a:pt x="4" y="9427"/>
+                    <a:pt x="0" y="9125"/>
+                  </a:cubicBezTo>
+                  <a:lnTo>
+                    <a:pt x="8763" y="9128"/>
+                  </a:lnTo>
+                  <a:lnTo>
+                    <a:pt x="8763" y="0"/>
+                  </a:lnTo>
+                  <a:close/>
+                </a:path>
+              </a:pathLst>
+            </a:custGeom>
+            <a:solidFill>
+              <a:schemeClr val="tx2"/>
+            </a:solidFill>
+            <a:ln w="0">
+              <a:noFill/>
+              <a:prstDash val="solid"/>
+              <a:round/>
+              <a:headEnd/>
+              <a:tailEnd/>
+            </a:ln>
+          </p:spPr>
+        </p:sp>
+      </p:grpSp>
+      <p:sp useBgFill="1">
+        <p:nvSpPr>
+          <p:cNvPr id="15" name="Rectangle 14">
+            <a:extLst>
+              <a:ext uri="{FF2B5EF4-FFF2-40B4-BE49-F238E27FC236}">
+                <a16:creationId xmlns:a16="http://schemas.microsoft.com/office/drawing/2014/main" id="{AAC11200-8B97-4CB4-99EF-7C0FA210F2C4}"/>
+              </a:ext>
+              <a:ext uri="{C183D7F6-B498-43B3-948B-1728B52AA6E4}">
+                <adec:decorative xmlns:adec="http://schemas.microsoft.com/office/drawing/2017/decorative" val="1"/>
+              </a:ext>
+            </a:extLst>
+          </p:cNvPr>
+          <p:cNvSpPr>
+            <a:spLocks noGrp="1" noRot="1" noChangeAspect="1" noMove="1" noResize="1" noEditPoints="1" noAdjustHandles="1" noChangeArrowheads="1" noChangeShapeType="1" noTextEdit="1"/>
+          </p:cNvSpPr>
+          <p:nvPr>
+            <p:extLst>
+              <p:ext uri="{386F3935-93C4-4BCD-93E2-E3B085C9AB24}">
+                <p16:designElem xmlns:p16="http://schemas.microsoft.com/office/powerpoint/2015/main" val="1"/>
+              </p:ext>
+            </p:extLst>
+          </p:nvPr>
+        </p:nvSpPr>
+        <p:spPr>
+          <a:xfrm>
+            <a:off x="-1895" y="0"/>
+            <a:ext cx="12192000" cy="6858000"/>
+          </a:xfrm>
+          <a:prstGeom prst="rect">
+            <a:avLst/>
+          </a:prstGeom>
+          <a:ln>
+            <a:noFill/>
+          </a:ln>
+        </p:spPr>
+        <p:style>
+          <a:lnRef idx="2">
+            <a:schemeClr val="accent1">
+              <a:shade val="50000"/>
+            </a:schemeClr>
+          </a:lnRef>
+          <a:fillRef idx="1001">
+            <a:schemeClr val="lt2"/>
+          </a:fillRef>
+          <a:effectRef idx="0">
+            <a:schemeClr val="accent1"/>
+          </a:effectRef>
+          <a:fontRef idx="minor">
+            <a:schemeClr val="lt1"/>
+          </a:fontRef>
+        </p:style>
+        <p:txBody>
+          <a:bodyPr rtlCol="0" anchor="ctr"/>
+          <a:lstStyle/>
+          <a:p>
+            <a:pPr algn="ctr"/>
+            <a:endParaRPr lang="en-US"/>
+          </a:p>
+        </p:txBody>
+      </p:sp>
       <p:sp>
         <p:nvSpPr>
           <p:cNvPr id="2" name="Title 1">
             <a:extLst>
               <a:ext uri="{FF2B5EF4-FFF2-40B4-BE49-F238E27FC236}">
-                <a16:creationId xmlns:a16="http://schemas.microsoft.com/office/drawing/2014/main" id="{26EA54CF-89F5-45FA-A3C0-00007C03B1C9}"/>
+                <a16:creationId xmlns:a16="http://schemas.microsoft.com/office/drawing/2014/main" id="{51DD6CD6-8828-4090-9D1E-A437A6E3F4B2}"/>
               </a:ext>
             </a:extLst>
           </p:cNvPr>
@@ -3907,47 +4153,963 @@
             <p:ph type="title"/>
           </p:nvPr>
         </p:nvSpPr>
-        <p:spPr/>
-        <p:txBody>
-          <a:bodyPr/>
+        <p:spPr>
+          <a:xfrm>
+            <a:off x="659230" y="4484772"/>
+            <a:ext cx="10869750" cy="1237298"/>
+          </a:xfrm>
+        </p:spPr>
+        <p:txBody>
+          <a:bodyPr vert="horz" lIns="91440" tIns="45720" rIns="91440" bIns="45720" rtlCol="0" anchor="b">
+            <a:normAutofit/>
+          </a:bodyPr>
           <a:lstStyle/>
           <a:p>
+            <a:pPr algn="ctr"/>
+            <a:r>
+              <a:rPr lang="en-US" sz="6700" cap="all"/>
+              <a:t>Roberts Edge Detection</a:t>
+            </a:r>
+          </a:p>
+        </p:txBody>
+      </p:sp>
+      <p:sp>
+        <p:nvSpPr>
+          <p:cNvPr id="17" name="Freeform 6">
+            <a:extLst>
+              <a:ext uri="{FF2B5EF4-FFF2-40B4-BE49-F238E27FC236}">
+                <a16:creationId xmlns:a16="http://schemas.microsoft.com/office/drawing/2014/main" id="{BB502E7E-3C82-47F3-B817-7507C01A1FCD}"/>
+              </a:ext>
+              <a:ext uri="{C183D7F6-B498-43B3-948B-1728B52AA6E4}">
+                <adec:decorative xmlns:adec="http://schemas.microsoft.com/office/drawing/2017/decorative" val="1"/>
+              </a:ext>
+            </a:extLst>
+          </p:cNvPr>
+          <p:cNvSpPr>
+            <a:spLocks noGrp="1" noRot="1" noChangeAspect="1" noMove="1" noResize="1" noEditPoints="1" noAdjustHandles="1" noChangeArrowheads="1" noChangeShapeType="1" noTextEdit="1"/>
+          </p:cNvSpPr>
+          <p:nvPr>
+            <p:extLst>
+              <p:ext uri="{386F3935-93C4-4BCD-93E2-E3B085C9AB24}">
+                <p16:designElem xmlns:p16="http://schemas.microsoft.com/office/powerpoint/2015/main" val="1"/>
+              </p:ext>
+            </p:extLst>
+          </p:nvPr>
+        </p:nvSpPr>
+        <p:spPr bwMode="auto">
+          <a:xfrm rot="5400000" flipH="1">
+            <a:off x="1046527" y="-133294"/>
+            <a:ext cx="3275668" cy="4408488"/>
+          </a:xfrm>
+          <a:custGeom>
+            <a:avLst/>
+            <a:gdLst/>
+            <a:ahLst/>
+            <a:cxnLst/>
+            <a:rect l="l" t="t" r="r" b="b"/>
+            <a:pathLst>
+              <a:path w="10002" h="10000">
+                <a:moveTo>
+                  <a:pt x="8763" y="0"/>
+                </a:moveTo>
+                <a:lnTo>
+                  <a:pt x="10002" y="0"/>
+                </a:lnTo>
+                <a:lnTo>
+                  <a:pt x="10002" y="10000"/>
+                </a:lnTo>
+                <a:lnTo>
+                  <a:pt x="2" y="10000"/>
+                </a:lnTo>
+                <a:cubicBezTo>
+                  <a:pt x="-2" y="9698"/>
+                  <a:pt x="4" y="9427"/>
+                  <a:pt x="0" y="9125"/>
+                </a:cubicBezTo>
+                <a:lnTo>
+                  <a:pt x="8763" y="9128"/>
+                </a:lnTo>
+                <a:lnTo>
+                  <a:pt x="8763" y="0"/>
+                </a:lnTo>
+                <a:close/>
+              </a:path>
+            </a:pathLst>
+          </a:custGeom>
+          <a:solidFill>
+            <a:schemeClr val="tx2"/>
+          </a:solidFill>
+          <a:ln w="0">
+            <a:noFill/>
+            <a:prstDash val="solid"/>
+            <a:round/>
+            <a:headEnd/>
+            <a:tailEnd/>
+          </a:ln>
+        </p:spPr>
+      </p:sp>
+      <p:pic>
+        <p:nvPicPr>
+          <p:cNvPr id="4" name="Content Placeholder 3" descr="A screenshot of a social media post&#10;&#10;Description automatically generated">
+            <a:extLst>
+              <a:ext uri="{FF2B5EF4-FFF2-40B4-BE49-F238E27FC236}">
+                <a16:creationId xmlns:a16="http://schemas.microsoft.com/office/drawing/2014/main" id="{26217464-7BDE-4E18-A681-FA4EFD0EE6D3}"/>
+              </a:ext>
+            </a:extLst>
+          </p:cNvPr>
+          <p:cNvPicPr>
+            <a:picLocks noGrp="1"/>
+          </p:cNvPicPr>
+          <p:nvPr>
+            <p:ph idx="1"/>
+          </p:nvPr>
+        </p:nvPicPr>
+        <p:blipFill>
+          <a:blip r:embed="rId2">
+            <a:extLst>
+              <a:ext uri="{28A0092B-C50C-407E-A947-70E740481C1C}">
+                <a14:useLocalDpi xmlns:a14="http://schemas.microsoft.com/office/drawing/2010/main" val="0"/>
+              </a:ext>
+            </a:extLst>
+          </a:blip>
+          <a:stretch>
+            <a:fillRect/>
+          </a:stretch>
+        </p:blipFill>
+        <p:spPr>
+          <a:xfrm>
+            <a:off x="1182863" y="1457718"/>
+            <a:ext cx="3078999" cy="1970559"/>
+          </a:xfrm>
+          <a:prstGeom prst="rect">
+            <a:avLst/>
+          </a:prstGeom>
+        </p:spPr>
+      </p:pic>
+      <p:sp>
+        <p:nvSpPr>
+          <p:cNvPr id="19" name="Freeform 6">
+            <a:extLst>
+              <a:ext uri="{FF2B5EF4-FFF2-40B4-BE49-F238E27FC236}">
+                <a16:creationId xmlns:a16="http://schemas.microsoft.com/office/drawing/2014/main" id="{3E5C639E-7A0B-46B2-9273-986E8BE7F119}"/>
+              </a:ext>
+              <a:ext uri="{C183D7F6-B498-43B3-948B-1728B52AA6E4}">
+                <adec:decorative xmlns:adec="http://schemas.microsoft.com/office/drawing/2017/decorative" val="1"/>
+              </a:ext>
+            </a:extLst>
+          </p:cNvPr>
+          <p:cNvSpPr>
+            <a:spLocks noGrp="1" noRot="1" noChangeAspect="1" noMove="1" noResize="1" noEditPoints="1" noAdjustHandles="1" noChangeArrowheads="1" noChangeShapeType="1" noTextEdit="1"/>
+          </p:cNvSpPr>
+          <p:nvPr>
+            <p:extLst>
+              <p:ext uri="{386F3935-93C4-4BCD-93E2-E3B085C9AB24}">
+                <p16:designElem xmlns:p16="http://schemas.microsoft.com/office/powerpoint/2015/main" val="1"/>
+              </p:ext>
+            </p:extLst>
+          </p:nvPr>
+        </p:nvSpPr>
+        <p:spPr bwMode="auto">
+          <a:xfrm rot="5400000" flipV="1">
+            <a:off x="7838485" y="614084"/>
+            <a:ext cx="3275013" cy="4408488"/>
+          </a:xfrm>
+          <a:custGeom>
+            <a:avLst/>
+            <a:gdLst/>
+            <a:ahLst/>
+            <a:cxnLst/>
+            <a:rect l="l" t="t" r="r" b="b"/>
+            <a:pathLst>
+              <a:path w="10000" h="10000">
+                <a:moveTo>
+                  <a:pt x="8761" y="0"/>
+                </a:moveTo>
+                <a:lnTo>
+                  <a:pt x="10000" y="0"/>
+                </a:lnTo>
+                <a:lnTo>
+                  <a:pt x="10000" y="10000"/>
+                </a:lnTo>
+                <a:lnTo>
+                  <a:pt x="0" y="10000"/>
+                </a:lnTo>
+                <a:lnTo>
+                  <a:pt x="0" y="9126"/>
+                </a:lnTo>
+                <a:lnTo>
+                  <a:pt x="8761" y="9127"/>
+                </a:lnTo>
+                <a:lnTo>
+                  <a:pt x="8761" y="0"/>
+                </a:lnTo>
+                <a:close/>
+              </a:path>
+            </a:pathLst>
+          </a:custGeom>
+          <a:solidFill>
+            <a:schemeClr val="tx2"/>
+          </a:solidFill>
+          <a:ln w="0">
+            <a:noFill/>
+            <a:prstDash val="solid"/>
+            <a:round/>
+            <a:headEnd/>
+            <a:tailEnd/>
+          </a:ln>
+        </p:spPr>
+      </p:sp>
+      <p:pic>
+        <p:nvPicPr>
+          <p:cNvPr id="5" name="Picture 4" descr="A screenshot of a cell phone&#10;&#10;Description automatically generated">
+            <a:extLst>
+              <a:ext uri="{FF2B5EF4-FFF2-40B4-BE49-F238E27FC236}">
+                <a16:creationId xmlns:a16="http://schemas.microsoft.com/office/drawing/2014/main" id="{78D13688-3741-4501-9C75-B6091890C531}"/>
+              </a:ext>
+            </a:extLst>
+          </p:cNvPr>
+          <p:cNvPicPr/>
+          <p:nvPr/>
+        </p:nvPicPr>
+        <p:blipFill>
+          <a:blip r:embed="rId3">
+            <a:extLst>
+              <a:ext uri="{28A0092B-C50C-407E-A947-70E740481C1C}">
+                <a14:useLocalDpi xmlns:a14="http://schemas.microsoft.com/office/drawing/2010/main" val="0"/>
+              </a:ext>
+            </a:extLst>
+          </a:blip>
+          <a:stretch>
+            <a:fillRect/>
+          </a:stretch>
+        </p:blipFill>
+        <p:spPr>
+          <a:xfrm>
+            <a:off x="4575233" y="1467159"/>
+            <a:ext cx="3049897" cy="1951934"/>
+          </a:xfrm>
+          <a:prstGeom prst="rect">
+            <a:avLst/>
+          </a:prstGeom>
+        </p:spPr>
+      </p:pic>
+      <p:pic>
+        <p:nvPicPr>
+          <p:cNvPr id="6" name="Picture 5" descr="C:\Users\karan\AppData\Local\Microsoft\Windows\INetCache\Content.MSO\9D2A8372.tmp">
+            <a:extLst>
+              <a:ext uri="{FF2B5EF4-FFF2-40B4-BE49-F238E27FC236}">
+                <a16:creationId xmlns:a16="http://schemas.microsoft.com/office/drawing/2014/main" id="{A4F0576C-0163-40C0-A27B-C7CE758EBA85}"/>
+              </a:ext>
+            </a:extLst>
+          </p:cNvPr>
+          <p:cNvPicPr/>
+          <p:nvPr/>
+        </p:nvPicPr>
+        <p:blipFill>
+          <a:blip r:embed="rId4">
+            <a:extLst>
+              <a:ext uri="{28A0092B-C50C-407E-A947-70E740481C1C}">
+                <a14:useLocalDpi xmlns:a14="http://schemas.microsoft.com/office/drawing/2010/main" val="0"/>
+              </a:ext>
+            </a:extLst>
+          </a:blip>
+          <a:stretch>
+            <a:fillRect/>
+          </a:stretch>
+        </p:blipFill>
+        <p:spPr bwMode="auto">
+          <a:xfrm>
+            <a:off x="7938502" y="1399181"/>
+            <a:ext cx="3041534" cy="2087633"/>
+          </a:xfrm>
+          <a:prstGeom prst="rect">
+            <a:avLst/>
+          </a:prstGeom>
+          <a:noFill/>
+        </p:spPr>
+      </p:pic>
+      <p:sp>
+        <p:nvSpPr>
+          <p:cNvPr id="7" name="TextBox 6">
+            <a:extLst>
+              <a:ext uri="{FF2B5EF4-FFF2-40B4-BE49-F238E27FC236}">
+                <a16:creationId xmlns:a16="http://schemas.microsoft.com/office/drawing/2014/main" id="{19E8CC6E-4283-4728-BC3C-3023FB9796E2}"/>
+              </a:ext>
+            </a:extLst>
+          </p:cNvPr>
+          <p:cNvSpPr txBox="1"/>
+          <p:nvPr/>
+        </p:nvSpPr>
+        <p:spPr>
+          <a:xfrm>
+            <a:off x="5623366" y="571233"/>
+            <a:ext cx="5057192" cy="369332"/>
+          </a:xfrm>
+          <a:prstGeom prst="rect">
+            <a:avLst/>
+          </a:prstGeom>
+          <a:noFill/>
+        </p:spPr>
+        <p:txBody>
+          <a:bodyPr wrap="square" rtlCol="0">
+            <a:spAutoFit/>
+          </a:bodyPr>
+          <a:lstStyle/>
+          <a:p>
             <a:r>
               <a:rPr lang="en-US" dirty="0"/>
-              <a:t>Takeaways:</a:t>
-            </a:r>
-          </a:p>
-        </p:txBody>
-      </p:sp>
-      <p:sp>
-        <p:nvSpPr>
-          <p:cNvPr id="3" name="Content Placeholder 2">
-            <a:extLst>
-              <a:ext uri="{FF2B5EF4-FFF2-40B4-BE49-F238E27FC236}">
-                <a16:creationId xmlns:a16="http://schemas.microsoft.com/office/drawing/2014/main" id="{01D6C645-6202-437C-AA10-2BFFD004F076}"/>
-              </a:ext>
-            </a:extLst>
-          </p:cNvPr>
-          <p:cNvSpPr>
-            <a:spLocks noGrp="1"/>
-          </p:cNvSpPr>
-          <p:nvPr>
-            <p:ph idx="1"/>
-          </p:nvPr>
-        </p:nvSpPr>
-        <p:spPr/>
-        <p:txBody>
-          <a:bodyPr/>
-          <a:lstStyle/>
-          <a:p>
-            <a:endParaRPr lang="en-US"/>
+              <a:t>81% acc training, 67% acc test</a:t>
+            </a:r>
           </a:p>
         </p:txBody>
       </p:sp>
     </p:spTree>
     <p:extLst>
       <p:ext uri="{BB962C8B-B14F-4D97-AF65-F5344CB8AC3E}">
-        <p14:creationId xmlns:p14="http://schemas.microsoft.com/office/powerpoint/2010/main" val="3962710087"/>
+        <p14:creationId xmlns:p14="http://schemas.microsoft.com/office/powerpoint/2010/main" val="2452270597"/>
+      </p:ext>
+    </p:extLst>
+  </p:cSld>
+  <p:clrMapOvr>
+    <a:masterClrMapping/>
+  </p:clrMapOvr>
+</p:sld>
+</file>
+
+<file path=ppt/slides/slide11.xml><?xml version="1.0" encoding="utf-8"?>
+<p:sld xmlns:a="http://schemas.openxmlformats.org/drawingml/2006/main" xmlns:r="http://schemas.openxmlformats.org/officeDocument/2006/relationships" xmlns:p="http://schemas.openxmlformats.org/presentationml/2006/main">
+  <p:cSld>
+    <p:bg>
+      <p:bgPr>
+        <a:solidFill>
+          <a:schemeClr val="bg2"/>
+        </a:solidFill>
+        <a:effectLst/>
+      </p:bgPr>
+    </p:bg>
+    <p:spTree>
+      <p:nvGrpSpPr>
+        <p:cNvPr id="1" name=""/>
+        <p:cNvGrpSpPr/>
+        <p:nvPr/>
+      </p:nvGrpSpPr>
+      <p:grpSpPr>
+        <a:xfrm>
+          <a:off x="0" y="0"/>
+          <a:ext cx="0" cy="0"/>
+          <a:chOff x="0" y="0"/>
+          <a:chExt cx="0" cy="0"/>
+        </a:xfrm>
+      </p:grpSpPr>
+      <p:sp useBgFill="1">
+        <p:nvSpPr>
+          <p:cNvPr id="71" name="Rectangle 70">
+            <a:extLst>
+              <a:ext uri="{FF2B5EF4-FFF2-40B4-BE49-F238E27FC236}">
+                <a16:creationId xmlns:a16="http://schemas.microsoft.com/office/drawing/2014/main" id="{1D868099-6145-4BC0-A5EA-74BEF1776BA9}"/>
+              </a:ext>
+              <a:ext uri="{C183D7F6-B498-43B3-948B-1728B52AA6E4}">
+                <adec:decorative xmlns:adec="http://schemas.microsoft.com/office/drawing/2017/decorative" val="1"/>
+              </a:ext>
+            </a:extLst>
+          </p:cNvPr>
+          <p:cNvSpPr>
+            <a:spLocks noGrp="1" noRot="1" noChangeAspect="1" noMove="1" noResize="1" noEditPoints="1" noAdjustHandles="1" noChangeArrowheads="1" noChangeShapeType="1" noTextEdit="1"/>
+          </p:cNvSpPr>
+          <p:nvPr>
+            <p:extLst>
+              <p:ext uri="{386F3935-93C4-4BCD-93E2-E3B085C9AB24}">
+                <p16:designElem xmlns:p16="http://schemas.microsoft.com/office/powerpoint/2015/main" val="1"/>
+              </p:ext>
+            </p:extLst>
+          </p:nvPr>
+        </p:nvSpPr>
+        <p:spPr>
+          <a:xfrm>
+            <a:off x="0" y="0"/>
+            <a:ext cx="12192000" cy="6858000"/>
+          </a:xfrm>
+          <a:prstGeom prst="rect">
+            <a:avLst/>
+          </a:prstGeom>
+          <a:ln>
+            <a:noFill/>
+          </a:ln>
+        </p:spPr>
+        <p:style>
+          <a:lnRef idx="2">
+            <a:schemeClr val="accent1">
+              <a:shade val="50000"/>
+            </a:schemeClr>
+          </a:lnRef>
+          <a:fillRef idx="1">
+            <a:schemeClr val="accent1"/>
+          </a:fillRef>
+          <a:effectRef idx="0">
+            <a:schemeClr val="accent1"/>
+          </a:effectRef>
+          <a:fontRef idx="minor">
+            <a:schemeClr val="lt1"/>
+          </a:fontRef>
+        </p:style>
+        <p:txBody>
+          <a:bodyPr rtlCol="0" anchor="ctr"/>
+          <a:lstStyle/>
+          <a:p>
+            <a:pPr algn="ctr"/>
+            <a:endParaRPr lang="en-US"/>
+          </a:p>
+        </p:txBody>
+      </p:sp>
+      <p:sp>
+        <p:nvSpPr>
+          <p:cNvPr id="2" name="Title 1">
+            <a:extLst>
+              <a:ext uri="{FF2B5EF4-FFF2-40B4-BE49-F238E27FC236}">
+                <a16:creationId xmlns:a16="http://schemas.microsoft.com/office/drawing/2014/main" id="{600E524F-2776-4225-AD4D-D64CDC1F372D}"/>
+              </a:ext>
+            </a:extLst>
+          </p:cNvPr>
+          <p:cNvSpPr>
+            <a:spLocks noGrp="1"/>
+          </p:cNvSpPr>
+          <p:nvPr>
+            <p:ph type="title"/>
+          </p:nvPr>
+        </p:nvSpPr>
+        <p:spPr>
+          <a:xfrm>
+            <a:off x="8471424" y="1110882"/>
+            <a:ext cx="3053039" cy="1060817"/>
+          </a:xfrm>
+        </p:spPr>
+        <p:txBody>
+          <a:bodyPr anchor="b">
+            <a:normAutofit/>
+          </a:bodyPr>
+          <a:lstStyle/>
+          <a:p>
+            <a:r>
+              <a:rPr lang="en-US" sz="2800"/>
+              <a:t>Assessment:</a:t>
+            </a:r>
+          </a:p>
+        </p:txBody>
+      </p:sp>
+      <p:pic>
+        <p:nvPicPr>
+          <p:cNvPr id="1026" name="Picture 2" descr="Image result for funny cat">
+            <a:extLst>
+              <a:ext uri="{FF2B5EF4-FFF2-40B4-BE49-F238E27FC236}">
+                <a16:creationId xmlns:a16="http://schemas.microsoft.com/office/drawing/2014/main" id="{978E7B2D-ADAE-4A16-922B-85E1E8536ECD}"/>
+              </a:ext>
+            </a:extLst>
+          </p:cNvPr>
+          <p:cNvPicPr>
+            <a:picLocks noChangeAspect="1" noChangeArrowheads="1"/>
+          </p:cNvPicPr>
+          <p:nvPr/>
+        </p:nvPicPr>
+        <p:blipFill>
+          <a:blip r:embed="rId2">
+            <a:extLst>
+              <a:ext uri="{28A0092B-C50C-407E-A947-70E740481C1C}">
+                <a14:useLocalDpi xmlns:a14="http://schemas.microsoft.com/office/drawing/2010/main" val="0"/>
+              </a:ext>
+            </a:extLst>
+          </a:blip>
+          <a:stretch>
+            <a:fillRect/>
+          </a:stretch>
+        </p:blipFill>
+        <p:spPr bwMode="auto">
+          <a:xfrm>
+            <a:off x="634275" y="867897"/>
+            <a:ext cx="6900380" cy="5122205"/>
+          </a:xfrm>
+          <a:prstGeom prst="rect">
+            <a:avLst/>
+          </a:prstGeom>
+          <a:noFill/>
+          <a:extLst>
+            <a:ext uri="{909E8E84-426E-40DD-AFC4-6F175D3DCCD1}">
+              <a14:hiddenFill xmlns:a14="http://schemas.microsoft.com/office/drawing/2010/main">
+                <a:solidFill>
+                  <a:srgbClr val="FFFFFF"/>
+                </a:solidFill>
+              </a14:hiddenFill>
+            </a:ext>
+          </a:extLst>
+        </p:spPr>
+      </p:pic>
+      <p:sp>
+        <p:nvSpPr>
+          <p:cNvPr id="3" name="Content Placeholder 2">
+            <a:extLst>
+              <a:ext uri="{FF2B5EF4-FFF2-40B4-BE49-F238E27FC236}">
+                <a16:creationId xmlns:a16="http://schemas.microsoft.com/office/drawing/2014/main" id="{C7EDE5FD-97EB-4388-A424-8F3FA5C8D729}"/>
+              </a:ext>
+            </a:extLst>
+          </p:cNvPr>
+          <p:cNvSpPr>
+            <a:spLocks noGrp="1"/>
+          </p:cNvSpPr>
+          <p:nvPr>
+            <p:ph idx="1"/>
+          </p:nvPr>
+        </p:nvSpPr>
+        <p:spPr>
+          <a:xfrm>
+            <a:off x="8471423" y="2286000"/>
+            <a:ext cx="3053039" cy="3931920"/>
+          </a:xfrm>
+        </p:spPr>
+        <p:txBody>
+          <a:bodyPr>
+            <a:normAutofit/>
+          </a:bodyPr>
+          <a:lstStyle/>
+          <a:p>
+            <a:r>
+              <a:rPr lang="en-US" sz="1600"/>
+              <a:t>Cause of error</a:t>
+            </a:r>
+          </a:p>
+          <a:p>
+            <a:pPr lvl="1"/>
+            <a:r>
+              <a:rPr lang="en-US" sz="1600"/>
+              <a:t>Distracting digits (Roberts edge)</a:t>
+            </a:r>
+          </a:p>
+          <a:p>
+            <a:pPr lvl="1"/>
+            <a:r>
+              <a:rPr lang="en-US" sz="1600"/>
+              <a:t>Training size</a:t>
+            </a:r>
+          </a:p>
+          <a:p>
+            <a:pPr lvl="1"/>
+            <a:r>
+              <a:rPr lang="en-US" sz="1600"/>
+              <a:t>Number of epochs</a:t>
+            </a:r>
+          </a:p>
+        </p:txBody>
+      </p:sp>
+      <p:sp>
+        <p:nvSpPr>
+          <p:cNvPr id="73" name="Freeform 6">
+            <a:extLst>
+              <a:ext uri="{FF2B5EF4-FFF2-40B4-BE49-F238E27FC236}">
+                <a16:creationId xmlns:a16="http://schemas.microsoft.com/office/drawing/2014/main" id="{CC1026F7-DECB-49B4-A565-518BBA445471}"/>
+              </a:ext>
+              <a:ext uri="{C183D7F6-B498-43B3-948B-1728B52AA6E4}">
+                <adec:decorative xmlns:adec="http://schemas.microsoft.com/office/drawing/2017/decorative" val="1"/>
+              </a:ext>
+            </a:extLst>
+          </p:cNvPr>
+          <p:cNvSpPr>
+            <a:spLocks noGrp="1" noRot="1" noChangeAspect="1" noMove="1" noResize="1" noEditPoints="1" noAdjustHandles="1" noChangeArrowheads="1" noChangeShapeType="1" noTextEdit="1"/>
+          </p:cNvSpPr>
+          <p:nvPr>
+            <p:extLst>
+              <p:ext uri="{386F3935-93C4-4BCD-93E2-E3B085C9AB24}">
+                <p16:designElem xmlns:p16="http://schemas.microsoft.com/office/powerpoint/2015/main" val="1"/>
+              </p:ext>
+            </p:extLst>
+          </p:nvPr>
+        </p:nvSpPr>
+        <p:spPr bwMode="auto">
+          <a:xfrm flipH="1" flipV="1">
+            <a:off x="7983434" y="640080"/>
+            <a:ext cx="2296028" cy="3674981"/>
+          </a:xfrm>
+          <a:custGeom>
+            <a:avLst/>
+            <a:gdLst/>
+            <a:ahLst/>
+            <a:cxnLst/>
+            <a:rect l="l" t="t" r="r" b="b"/>
+            <a:pathLst>
+              <a:path w="10002" h="10000">
+                <a:moveTo>
+                  <a:pt x="8763" y="0"/>
+                </a:moveTo>
+                <a:lnTo>
+                  <a:pt x="10002" y="0"/>
+                </a:lnTo>
+                <a:lnTo>
+                  <a:pt x="10002" y="10000"/>
+                </a:lnTo>
+                <a:lnTo>
+                  <a:pt x="2" y="10000"/>
+                </a:lnTo>
+                <a:cubicBezTo>
+                  <a:pt x="-2" y="9698"/>
+                  <a:pt x="4" y="9427"/>
+                  <a:pt x="0" y="9125"/>
+                </a:cubicBezTo>
+                <a:lnTo>
+                  <a:pt x="8763" y="9128"/>
+                </a:lnTo>
+                <a:lnTo>
+                  <a:pt x="8763" y="0"/>
+                </a:lnTo>
+                <a:close/>
+              </a:path>
+            </a:pathLst>
+          </a:custGeom>
+          <a:solidFill>
+            <a:schemeClr val="tx2"/>
+          </a:solidFill>
+          <a:ln w="0">
+            <a:noFill/>
+            <a:prstDash val="solid"/>
+            <a:round/>
+            <a:headEnd/>
+            <a:tailEnd/>
+          </a:ln>
+        </p:spPr>
+      </p:sp>
+    </p:spTree>
+    <p:extLst>
+      <p:ext uri="{BB962C8B-B14F-4D97-AF65-F5344CB8AC3E}">
+        <p14:creationId xmlns:p14="http://schemas.microsoft.com/office/powerpoint/2010/main" val="1536465809"/>
+      </p:ext>
+    </p:extLst>
+  </p:cSld>
+  <p:clrMapOvr>
+    <a:overrideClrMapping bg1="dk1" tx1="lt1" bg2="dk2" tx2="lt2" accent1="accent1" accent2="accent2" accent3="accent3" accent4="accent4" accent5="accent5" accent6="accent6" hlink="hlink" folHlink="folHlink"/>
+  </p:clrMapOvr>
+</p:sld>
+</file>
+
+<file path=ppt/slides/slide12.xml><?xml version="1.0" encoding="utf-8"?>
+<p:sld xmlns:a="http://schemas.openxmlformats.org/drawingml/2006/main" xmlns:r="http://schemas.openxmlformats.org/officeDocument/2006/relationships" xmlns:p="http://schemas.openxmlformats.org/presentationml/2006/main">
+  <p:cSld>
+    <p:bg>
+      <p:bgPr>
+        <a:solidFill>
+          <a:schemeClr val="bg2"/>
+        </a:solidFill>
+        <a:effectLst/>
+      </p:bgPr>
+    </p:bg>
+    <p:spTree>
+      <p:nvGrpSpPr>
+        <p:cNvPr id="1" name=""/>
+        <p:cNvGrpSpPr/>
+        <p:nvPr/>
+      </p:nvGrpSpPr>
+      <p:grpSpPr>
+        <a:xfrm>
+          <a:off x="0" y="0"/>
+          <a:ext cx="0" cy="0"/>
+          <a:chOff x="0" y="0"/>
+          <a:chExt cx="0" cy="0"/>
+        </a:xfrm>
+      </p:grpSpPr>
+      <p:pic>
+        <p:nvPicPr>
+          <p:cNvPr id="2050" name="Picture 2" descr="Image result for education">
+            <a:extLst>
+              <a:ext uri="{FF2B5EF4-FFF2-40B4-BE49-F238E27FC236}">
+                <a16:creationId xmlns:a16="http://schemas.microsoft.com/office/drawing/2014/main" id="{37081534-07E3-4FE1-BAC6-968D4140CB5F}"/>
+              </a:ext>
+            </a:extLst>
+          </p:cNvPr>
+          <p:cNvPicPr>
+            <a:picLocks noChangeAspect="1" noChangeArrowheads="1"/>
+          </p:cNvPicPr>
+          <p:nvPr/>
+        </p:nvPicPr>
+        <p:blipFill rotWithShape="1">
+          <a:blip r:embed="rId2">
+            <a:extLst>
+              <a:ext uri="{28A0092B-C50C-407E-A947-70E740481C1C}">
+                <a14:useLocalDpi xmlns:a14="http://schemas.microsoft.com/office/drawing/2010/main" val="0"/>
+              </a:ext>
+            </a:extLst>
+          </a:blip>
+          <a:srcRect t="15707" r="1" b="1"/>
+          <a:stretch/>
+        </p:blipFill>
+        <p:spPr bwMode="auto">
+          <a:xfrm>
+            <a:off x="-1" y="10"/>
+            <a:ext cx="12188652" cy="6857990"/>
+          </a:xfrm>
+          <a:prstGeom prst="rect">
+            <a:avLst/>
+          </a:prstGeom>
+          <a:noFill/>
+          <a:extLst>
+            <a:ext uri="{909E8E84-426E-40DD-AFC4-6F175D3DCCD1}">
+              <a14:hiddenFill xmlns:a14="http://schemas.microsoft.com/office/drawing/2010/main">
+                <a:solidFill>
+                  <a:srgbClr val="FFFFFF"/>
+                </a:solidFill>
+              </a14:hiddenFill>
+            </a:ext>
+          </a:extLst>
+        </p:spPr>
+      </p:pic>
+      <p:sp>
+        <p:nvSpPr>
+          <p:cNvPr id="71" name="Rectangle 70">
+            <a:extLst>
+              <a:ext uri="{FF2B5EF4-FFF2-40B4-BE49-F238E27FC236}">
+                <a16:creationId xmlns:a16="http://schemas.microsoft.com/office/drawing/2014/main" id="{2078F889-8780-48D5-8B9E-DF8B13063783}"/>
+              </a:ext>
+              <a:ext uri="{C183D7F6-B498-43B3-948B-1728B52AA6E4}">
+                <adec:decorative xmlns:adec="http://schemas.microsoft.com/office/drawing/2017/decorative" val="1"/>
+              </a:ext>
+            </a:extLst>
+          </p:cNvPr>
+          <p:cNvSpPr>
+            <a:spLocks noGrp="1" noRot="1" noChangeAspect="1" noMove="1" noResize="1" noEditPoints="1" noAdjustHandles="1" noChangeArrowheads="1" noChangeShapeType="1" noTextEdit="1"/>
+          </p:cNvSpPr>
+          <p:nvPr>
+            <p:extLst>
+              <p:ext uri="{386F3935-93C4-4BCD-93E2-E3B085C9AB24}">
+                <p16:designElem xmlns:p16="http://schemas.microsoft.com/office/powerpoint/2015/main" val="1"/>
+              </p:ext>
+            </p:extLst>
+          </p:nvPr>
+        </p:nvSpPr>
+        <p:spPr bwMode="ltGray">
+          <a:xfrm>
+            <a:off x="-258" y="0"/>
+            <a:ext cx="12192000" cy="6858000"/>
+          </a:xfrm>
+          <a:prstGeom prst="rect">
+            <a:avLst/>
+          </a:prstGeom>
+          <a:gradFill flip="none" rotWithShape="1">
+            <a:gsLst>
+              <a:gs pos="20000">
+                <a:schemeClr val="tx2">
+                  <a:alpha val="70000"/>
+                </a:schemeClr>
+              </a:gs>
+              <a:gs pos="100000">
+                <a:schemeClr val="tx2"/>
+              </a:gs>
+            </a:gsLst>
+            <a:path path="circle">
+              <a:fillToRect l="50000" t="50000" r="50000" b="50000"/>
+            </a:path>
+            <a:tileRect/>
+          </a:gradFill>
+          <a:ln>
+            <a:noFill/>
+          </a:ln>
+        </p:spPr>
+        <p:style>
+          <a:lnRef idx="2">
+            <a:schemeClr val="accent1">
+              <a:shade val="50000"/>
+            </a:schemeClr>
+          </a:lnRef>
+          <a:fillRef idx="1">
+            <a:schemeClr val="accent1"/>
+          </a:fillRef>
+          <a:effectRef idx="0">
+            <a:schemeClr val="accent1"/>
+          </a:effectRef>
+          <a:fontRef idx="minor">
+            <a:schemeClr val="lt1"/>
+          </a:fontRef>
+        </p:style>
+        <p:txBody>
+          <a:bodyPr rtlCol="0" anchor="ctr"/>
+          <a:lstStyle/>
+          <a:p>
+            <a:pPr algn="ctr"/>
+            <a:endParaRPr lang="en-US"/>
+          </a:p>
+        </p:txBody>
+      </p:sp>
+      <p:sp>
+        <p:nvSpPr>
+          <p:cNvPr id="2" name="Title 1">
+            <a:extLst>
+              <a:ext uri="{FF2B5EF4-FFF2-40B4-BE49-F238E27FC236}">
+                <a16:creationId xmlns:a16="http://schemas.microsoft.com/office/drawing/2014/main" id="{558FA6D1-714F-4997-AE9A-86CA309118A8}"/>
+              </a:ext>
+            </a:extLst>
+          </p:cNvPr>
+          <p:cNvSpPr>
+            <a:spLocks noGrp="1"/>
+          </p:cNvSpPr>
+          <p:nvPr>
+            <p:ph type="title"/>
+          </p:nvPr>
+        </p:nvSpPr>
+        <p:spPr>
+          <a:xfrm>
+            <a:off x="1371600" y="685800"/>
+            <a:ext cx="9601200" cy="1485900"/>
+          </a:xfrm>
+        </p:spPr>
+        <p:txBody>
+          <a:bodyPr>
+            <a:normAutofit/>
+          </a:bodyPr>
+          <a:lstStyle/>
+          <a:p>
+            <a:r>
+              <a:rPr lang="en-US">
+                <a:solidFill>
+                  <a:schemeClr val="bg2"/>
+                </a:solidFill>
+              </a:rPr>
+              <a:t>Applications:</a:t>
+            </a:r>
+          </a:p>
+        </p:txBody>
+      </p:sp>
+      <p:sp>
+        <p:nvSpPr>
+          <p:cNvPr id="73" name="Rectangle 72">
+            <a:extLst>
+              <a:ext uri="{FF2B5EF4-FFF2-40B4-BE49-F238E27FC236}">
+                <a16:creationId xmlns:a16="http://schemas.microsoft.com/office/drawing/2014/main" id="{3A4CABA2-22A0-44B2-BD92-28FF73FCEA27}"/>
+              </a:ext>
+              <a:ext uri="{C183D7F6-B498-43B3-948B-1728B52AA6E4}">
+                <adec:decorative xmlns:adec="http://schemas.microsoft.com/office/drawing/2017/decorative" val="1"/>
+              </a:ext>
+            </a:extLst>
+          </p:cNvPr>
+          <p:cNvSpPr>
+            <a:spLocks noGrp="1" noRot="1" noChangeAspect="1" noMove="1" noResize="1" noEditPoints="1" noAdjustHandles="1" noChangeArrowheads="1" noChangeShapeType="1" noTextEdit="1"/>
+          </p:cNvSpPr>
+          <p:nvPr>
+            <p:extLst>
+              <p:ext uri="{386F3935-93C4-4BCD-93E2-E3B085C9AB24}">
+                <p16:designElem xmlns:p16="http://schemas.microsoft.com/office/powerpoint/2015/main" val="1"/>
+              </p:ext>
+            </p:extLst>
+          </p:nvPr>
+        </p:nvSpPr>
+        <p:spPr>
+          <a:xfrm>
+            <a:off x="478095" y="376"/>
+            <a:ext cx="228600" cy="6858000"/>
+          </a:xfrm>
+          <a:prstGeom prst="rect">
+            <a:avLst/>
+          </a:prstGeom>
+          <a:solidFill>
+            <a:schemeClr val="bg2"/>
+          </a:solidFill>
+          <a:ln>
+            <a:noFill/>
+          </a:ln>
+        </p:spPr>
+        <p:style>
+          <a:lnRef idx="2">
+            <a:schemeClr val="accent1">
+              <a:shade val="50000"/>
+            </a:schemeClr>
+          </a:lnRef>
+          <a:fillRef idx="1">
+            <a:schemeClr val="accent1"/>
+          </a:fillRef>
+          <a:effectRef idx="0">
+            <a:schemeClr val="accent1"/>
+          </a:effectRef>
+          <a:fontRef idx="minor">
+            <a:schemeClr val="lt1"/>
+          </a:fontRef>
+        </p:style>
+      </p:sp>
+      <p:sp>
+        <p:nvSpPr>
+          <p:cNvPr id="3" name="Content Placeholder 2">
+            <a:extLst>
+              <a:ext uri="{FF2B5EF4-FFF2-40B4-BE49-F238E27FC236}">
+                <a16:creationId xmlns:a16="http://schemas.microsoft.com/office/drawing/2014/main" id="{E70CD39A-357F-495F-ADEB-AF80959B586E}"/>
+              </a:ext>
+            </a:extLst>
+          </p:cNvPr>
+          <p:cNvSpPr>
+            <a:spLocks noGrp="1"/>
+          </p:cNvSpPr>
+          <p:nvPr>
+            <p:ph idx="1"/>
+          </p:nvPr>
+        </p:nvSpPr>
+        <p:spPr>
+          <a:xfrm>
+            <a:off x="1371600" y="2286000"/>
+            <a:ext cx="9601200" cy="3581400"/>
+          </a:xfrm>
+        </p:spPr>
+        <p:txBody>
+          <a:bodyPr>
+            <a:normAutofit/>
+          </a:bodyPr>
+          <a:lstStyle/>
+          <a:p>
+            <a:r>
+              <a:rPr lang="en-US" dirty="0">
+                <a:solidFill>
+                  <a:schemeClr val="bg2"/>
+                </a:solidFill>
+              </a:rPr>
+              <a:t>Generalizable number detection</a:t>
+            </a:r>
+          </a:p>
+          <a:p>
+            <a:pPr lvl="1"/>
+            <a:r>
+              <a:rPr lang="en-US" dirty="0">
+                <a:solidFill>
+                  <a:schemeClr val="bg2"/>
+                </a:solidFill>
+              </a:rPr>
+              <a:t>Education</a:t>
+            </a:r>
+          </a:p>
+          <a:p>
+            <a:pPr lvl="1"/>
+            <a:r>
+              <a:rPr lang="en-US" dirty="0">
+                <a:solidFill>
+                  <a:schemeClr val="bg2"/>
+                </a:solidFill>
+              </a:rPr>
+              <a:t>Character recognition for alphabet </a:t>
+            </a:r>
+            <a:r>
+              <a:rPr lang="en-US">
+                <a:solidFill>
+                  <a:schemeClr val="bg2"/>
+                </a:solidFill>
+              </a:rPr>
+              <a:t>and languages</a:t>
+            </a:r>
+          </a:p>
+          <a:p>
+            <a:pPr lvl="1"/>
+            <a:r>
+              <a:rPr lang="en-US" dirty="0">
+                <a:solidFill>
+                  <a:schemeClr val="bg2"/>
+                </a:solidFill>
+              </a:rPr>
+              <a:t>Reading bank checks and other financial documents</a:t>
+            </a:r>
+          </a:p>
+        </p:txBody>
+      </p:sp>
+    </p:spTree>
+    <p:extLst>
+      <p:ext uri="{BB962C8B-B14F-4D97-AF65-F5344CB8AC3E}">
+        <p14:creationId xmlns:p14="http://schemas.microsoft.com/office/powerpoint/2010/main" val="774764481"/>
       </p:ext>
     </p:extLst>
   </p:cSld>
@@ -5299,6 +6461,608 @@
 </file>
 
 <file path=ppt/slides/slide6.xml><?xml version="1.0" encoding="utf-8"?>
+<p:sld xmlns:a="http://schemas.openxmlformats.org/drawingml/2006/main" xmlns:r="http://schemas.openxmlformats.org/officeDocument/2006/relationships" xmlns:p="http://schemas.openxmlformats.org/presentationml/2006/main">
+  <p:cSld>
+    <p:bg>
+      <p:bgPr>
+        <a:solidFill>
+          <a:schemeClr val="bg2"/>
+        </a:solidFill>
+        <a:effectLst/>
+      </p:bgPr>
+    </p:bg>
+    <p:spTree>
+      <p:nvGrpSpPr>
+        <p:cNvPr id="1" name=""/>
+        <p:cNvGrpSpPr/>
+        <p:nvPr/>
+      </p:nvGrpSpPr>
+      <p:grpSpPr>
+        <a:xfrm>
+          <a:off x="0" y="0"/>
+          <a:ext cx="0" cy="0"/>
+          <a:chOff x="0" y="0"/>
+          <a:chExt cx="0" cy="0"/>
+        </a:xfrm>
+      </p:grpSpPr>
+      <p:grpSp>
+        <p:nvGrpSpPr>
+          <p:cNvPr id="12" name="Group 11">
+            <a:extLst>
+              <a:ext uri="{FF2B5EF4-FFF2-40B4-BE49-F238E27FC236}">
+                <a16:creationId xmlns:a16="http://schemas.microsoft.com/office/drawing/2014/main" id="{57500303-A207-4812-BEB9-51E132FEB73F}"/>
+              </a:ext>
+              <a:ext uri="{C183D7F6-B498-43B3-948B-1728B52AA6E4}">
+                <adec:decorative xmlns:adec="http://schemas.microsoft.com/office/drawing/2017/decorative" val="1"/>
+              </a:ext>
+            </a:extLst>
+          </p:cNvPr>
+          <p:cNvGrpSpPr>
+            <a:grpSpLocks noGrp="1" noUngrp="1" noRot="1" noChangeAspect="1" noMove="1" noResize="1"/>
+          </p:cNvGrpSpPr>
+          <p:nvPr>
+            <p:extLst>
+              <p:ext uri="{386F3935-93C4-4BCD-93E2-E3B085C9AB24}">
+                <p16:designElem xmlns:p16="http://schemas.microsoft.com/office/powerpoint/2015/main" val="1"/>
+              </p:ext>
+            </p:extLst>
+          </p:nvPr>
+        </p:nvGrpSpPr>
+        <p:grpSpPr>
+          <a:xfrm>
+            <a:off x="752858" y="744469"/>
+            <a:ext cx="10674117" cy="5349671"/>
+            <a:chOff x="752858" y="744469"/>
+            <a:chExt cx="10674117" cy="5349671"/>
+          </a:xfrm>
+        </p:grpSpPr>
+        <p:sp>
+          <p:nvSpPr>
+            <p:cNvPr id="13" name="Freeform 6">
+              <a:extLst>
+                <a:ext uri="{FF2B5EF4-FFF2-40B4-BE49-F238E27FC236}">
+                  <a16:creationId xmlns:a16="http://schemas.microsoft.com/office/drawing/2014/main" id="{10118C91-C025-4776-BE95-E9926378E790}"/>
+                </a:ext>
+                <a:ext uri="{C183D7F6-B498-43B3-948B-1728B52AA6E4}">
+                  <adec:decorative xmlns:adec="http://schemas.microsoft.com/office/drawing/2017/decorative" val="1"/>
+                </a:ext>
+              </a:extLst>
+            </p:cNvPr>
+            <p:cNvSpPr/>
+            <p:nvPr>
+              <p:extLst>
+                <p:ext uri="{386F3935-93C4-4BCD-93E2-E3B085C9AB24}">
+                  <p16:designElem xmlns:p16="http://schemas.microsoft.com/office/powerpoint/2015/main" val="1"/>
+                </p:ext>
+              </p:extLst>
+            </p:nvPr>
+          </p:nvSpPr>
+          <p:spPr bwMode="auto">
+            <a:xfrm>
+              <a:off x="8151962" y="1685652"/>
+              <a:ext cx="3275013" cy="4408488"/>
+            </a:xfrm>
+            <a:custGeom>
+              <a:avLst/>
+              <a:gdLst/>
+              <a:ahLst/>
+              <a:cxnLst/>
+              <a:rect l="l" t="t" r="r" b="b"/>
+              <a:pathLst>
+                <a:path w="10000" h="10000">
+                  <a:moveTo>
+                    <a:pt x="8761" y="0"/>
+                  </a:moveTo>
+                  <a:lnTo>
+                    <a:pt x="10000" y="0"/>
+                  </a:lnTo>
+                  <a:lnTo>
+                    <a:pt x="10000" y="10000"/>
+                  </a:lnTo>
+                  <a:lnTo>
+                    <a:pt x="0" y="10000"/>
+                  </a:lnTo>
+                  <a:lnTo>
+                    <a:pt x="0" y="9126"/>
+                  </a:lnTo>
+                  <a:lnTo>
+                    <a:pt x="8761" y="9127"/>
+                  </a:lnTo>
+                  <a:lnTo>
+                    <a:pt x="8761" y="0"/>
+                  </a:lnTo>
+                  <a:close/>
+                </a:path>
+              </a:pathLst>
+            </a:custGeom>
+            <a:solidFill>
+              <a:schemeClr val="tx2"/>
+            </a:solidFill>
+            <a:ln w="0">
+              <a:noFill/>
+              <a:prstDash val="solid"/>
+              <a:round/>
+              <a:headEnd/>
+              <a:tailEnd/>
+            </a:ln>
+          </p:spPr>
+        </p:sp>
+        <p:sp>
+          <p:nvSpPr>
+            <p:cNvPr id="14" name="Freeform 6">
+              <a:extLst>
+                <a:ext uri="{FF2B5EF4-FFF2-40B4-BE49-F238E27FC236}">
+                  <a16:creationId xmlns:a16="http://schemas.microsoft.com/office/drawing/2014/main" id="{339174D0-30E8-4BBF-BF81-5DDAC33C0C0E}"/>
+                </a:ext>
+                <a:ext uri="{C183D7F6-B498-43B3-948B-1728B52AA6E4}">
+                  <adec:decorative xmlns:adec="http://schemas.microsoft.com/office/drawing/2017/decorative" val="1"/>
+                </a:ext>
+              </a:extLst>
+            </p:cNvPr>
+            <p:cNvSpPr/>
+            <p:nvPr>
+              <p:extLst>
+                <p:ext uri="{386F3935-93C4-4BCD-93E2-E3B085C9AB24}">
+                  <p16:designElem xmlns:p16="http://schemas.microsoft.com/office/powerpoint/2015/main" val="1"/>
+                </p:ext>
+              </p:extLst>
+            </p:nvPr>
+          </p:nvSpPr>
+          <p:spPr bwMode="auto">
+            <a:xfrm flipH="1" flipV="1">
+              <a:off x="752858" y="744469"/>
+              <a:ext cx="3275668" cy="4408488"/>
+            </a:xfrm>
+            <a:custGeom>
+              <a:avLst/>
+              <a:gdLst/>
+              <a:ahLst/>
+              <a:cxnLst/>
+              <a:rect l="l" t="t" r="r" b="b"/>
+              <a:pathLst>
+                <a:path w="10002" h="10000">
+                  <a:moveTo>
+                    <a:pt x="8763" y="0"/>
+                  </a:moveTo>
+                  <a:lnTo>
+                    <a:pt x="10002" y="0"/>
+                  </a:lnTo>
+                  <a:lnTo>
+                    <a:pt x="10002" y="10000"/>
+                  </a:lnTo>
+                  <a:lnTo>
+                    <a:pt x="2" y="10000"/>
+                  </a:lnTo>
+                  <a:cubicBezTo>
+                    <a:pt x="-2" y="9698"/>
+                    <a:pt x="4" y="9427"/>
+                    <a:pt x="0" y="9125"/>
+                  </a:cubicBezTo>
+                  <a:lnTo>
+                    <a:pt x="8763" y="9128"/>
+                  </a:lnTo>
+                  <a:lnTo>
+                    <a:pt x="8763" y="0"/>
+                  </a:lnTo>
+                  <a:close/>
+                </a:path>
+              </a:pathLst>
+            </a:custGeom>
+            <a:solidFill>
+              <a:schemeClr val="tx2"/>
+            </a:solidFill>
+            <a:ln w="0">
+              <a:noFill/>
+              <a:prstDash val="solid"/>
+              <a:round/>
+              <a:headEnd/>
+              <a:tailEnd/>
+            </a:ln>
+          </p:spPr>
+        </p:sp>
+      </p:grpSp>
+      <p:sp useBgFill="1">
+        <p:nvSpPr>
+          <p:cNvPr id="16" name="Rectangle 15">
+            <a:extLst>
+              <a:ext uri="{FF2B5EF4-FFF2-40B4-BE49-F238E27FC236}">
+                <a16:creationId xmlns:a16="http://schemas.microsoft.com/office/drawing/2014/main" id="{AAC11200-8B97-4CB4-99EF-7C0FA210F2C4}"/>
+              </a:ext>
+              <a:ext uri="{C183D7F6-B498-43B3-948B-1728B52AA6E4}">
+                <adec:decorative xmlns:adec="http://schemas.microsoft.com/office/drawing/2017/decorative" val="1"/>
+              </a:ext>
+            </a:extLst>
+          </p:cNvPr>
+          <p:cNvSpPr>
+            <a:spLocks noGrp="1" noRot="1" noChangeAspect="1" noMove="1" noResize="1" noEditPoints="1" noAdjustHandles="1" noChangeArrowheads="1" noChangeShapeType="1" noTextEdit="1"/>
+          </p:cNvSpPr>
+          <p:nvPr>
+            <p:extLst>
+              <p:ext uri="{386F3935-93C4-4BCD-93E2-E3B085C9AB24}">
+                <p16:designElem xmlns:p16="http://schemas.microsoft.com/office/powerpoint/2015/main" val="1"/>
+              </p:ext>
+            </p:extLst>
+          </p:nvPr>
+        </p:nvSpPr>
+        <p:spPr>
+          <a:xfrm>
+            <a:off x="-1895" y="0"/>
+            <a:ext cx="12192000" cy="6858000"/>
+          </a:xfrm>
+          <a:prstGeom prst="rect">
+            <a:avLst/>
+          </a:prstGeom>
+          <a:ln>
+            <a:noFill/>
+          </a:ln>
+        </p:spPr>
+        <p:style>
+          <a:lnRef idx="2">
+            <a:schemeClr val="accent1">
+              <a:shade val="50000"/>
+            </a:schemeClr>
+          </a:lnRef>
+          <a:fillRef idx="1001">
+            <a:schemeClr val="lt2"/>
+          </a:fillRef>
+          <a:effectRef idx="0">
+            <a:schemeClr val="accent1"/>
+          </a:effectRef>
+          <a:fontRef idx="minor">
+            <a:schemeClr val="lt1"/>
+          </a:fontRef>
+        </p:style>
+        <p:txBody>
+          <a:bodyPr rtlCol="0" anchor="ctr"/>
+          <a:lstStyle/>
+          <a:p>
+            <a:pPr algn="ctr"/>
+            <a:endParaRPr lang="en-US"/>
+          </a:p>
+        </p:txBody>
+      </p:sp>
+      <p:sp>
+        <p:nvSpPr>
+          <p:cNvPr id="2" name="Title 1">
+            <a:extLst>
+              <a:ext uri="{FF2B5EF4-FFF2-40B4-BE49-F238E27FC236}">
+                <a16:creationId xmlns:a16="http://schemas.microsoft.com/office/drawing/2014/main" id="{26EA54CF-89F5-45FA-A3C0-00007C03B1C9}"/>
+              </a:ext>
+            </a:extLst>
+          </p:cNvPr>
+          <p:cNvSpPr>
+            <a:spLocks noGrp="1"/>
+          </p:cNvSpPr>
+          <p:nvPr>
+            <p:ph type="title"/>
+          </p:nvPr>
+        </p:nvSpPr>
+        <p:spPr>
+          <a:xfrm>
+            <a:off x="659230" y="4484772"/>
+            <a:ext cx="10869750" cy="1237298"/>
+          </a:xfrm>
+        </p:spPr>
+        <p:txBody>
+          <a:bodyPr vert="horz" lIns="91440" tIns="45720" rIns="91440" bIns="45720" rtlCol="0" anchor="b">
+            <a:normAutofit/>
+          </a:bodyPr>
+          <a:lstStyle/>
+          <a:p>
+            <a:pPr algn="ctr"/>
+            <a:r>
+              <a:rPr lang="en-US" sz="7200" cap="all"/>
+              <a:t>Pre-Process:</a:t>
+            </a:r>
+          </a:p>
+        </p:txBody>
+      </p:sp>
+      <p:sp>
+        <p:nvSpPr>
+          <p:cNvPr id="18" name="Freeform 6">
+            <a:extLst>
+              <a:ext uri="{FF2B5EF4-FFF2-40B4-BE49-F238E27FC236}">
+                <a16:creationId xmlns:a16="http://schemas.microsoft.com/office/drawing/2014/main" id="{BB502E7E-3C82-47F3-B817-7507C01A1FCD}"/>
+              </a:ext>
+              <a:ext uri="{C183D7F6-B498-43B3-948B-1728B52AA6E4}">
+                <adec:decorative xmlns:adec="http://schemas.microsoft.com/office/drawing/2017/decorative" val="1"/>
+              </a:ext>
+            </a:extLst>
+          </p:cNvPr>
+          <p:cNvSpPr>
+            <a:spLocks noGrp="1" noRot="1" noChangeAspect="1" noMove="1" noResize="1" noEditPoints="1" noAdjustHandles="1" noChangeArrowheads="1" noChangeShapeType="1" noTextEdit="1"/>
+          </p:cNvSpPr>
+          <p:nvPr>
+            <p:extLst>
+              <p:ext uri="{386F3935-93C4-4BCD-93E2-E3B085C9AB24}">
+                <p16:designElem xmlns:p16="http://schemas.microsoft.com/office/powerpoint/2015/main" val="1"/>
+              </p:ext>
+            </p:extLst>
+          </p:nvPr>
+        </p:nvSpPr>
+        <p:spPr bwMode="auto">
+          <a:xfrm rot="5400000" flipH="1">
+            <a:off x="1046527" y="-133294"/>
+            <a:ext cx="3275668" cy="4408488"/>
+          </a:xfrm>
+          <a:custGeom>
+            <a:avLst/>
+            <a:gdLst/>
+            <a:ahLst/>
+            <a:cxnLst/>
+            <a:rect l="l" t="t" r="r" b="b"/>
+            <a:pathLst>
+              <a:path w="10002" h="10000">
+                <a:moveTo>
+                  <a:pt x="8763" y="0"/>
+                </a:moveTo>
+                <a:lnTo>
+                  <a:pt x="10002" y="0"/>
+                </a:lnTo>
+                <a:lnTo>
+                  <a:pt x="10002" y="10000"/>
+                </a:lnTo>
+                <a:lnTo>
+                  <a:pt x="2" y="10000"/>
+                </a:lnTo>
+                <a:cubicBezTo>
+                  <a:pt x="-2" y="9698"/>
+                  <a:pt x="4" y="9427"/>
+                  <a:pt x="0" y="9125"/>
+                </a:cubicBezTo>
+                <a:lnTo>
+                  <a:pt x="8763" y="9128"/>
+                </a:lnTo>
+                <a:lnTo>
+                  <a:pt x="8763" y="0"/>
+                </a:lnTo>
+                <a:close/>
+              </a:path>
+            </a:pathLst>
+          </a:custGeom>
+          <a:solidFill>
+            <a:schemeClr val="tx2"/>
+          </a:solidFill>
+          <a:ln w="0">
+            <a:noFill/>
+            <a:prstDash val="solid"/>
+            <a:round/>
+            <a:headEnd/>
+            <a:tailEnd/>
+          </a:ln>
+        </p:spPr>
+      </p:sp>
+      <p:pic>
+        <p:nvPicPr>
+          <p:cNvPr id="6" name="Picture 5" descr="C:\Users\karan\AppData\Local\Microsoft\Windows\INetCache\Content.MSO\422CB768.tmp">
+            <a:extLst>
+              <a:ext uri="{FF2B5EF4-FFF2-40B4-BE49-F238E27FC236}">
+                <a16:creationId xmlns:a16="http://schemas.microsoft.com/office/drawing/2014/main" id="{95B7F02B-A890-4C3F-9EFF-77563691ABB7}"/>
+              </a:ext>
+            </a:extLst>
+          </p:cNvPr>
+          <p:cNvPicPr/>
+          <p:nvPr/>
+        </p:nvPicPr>
+        <p:blipFill>
+          <a:blip r:embed="rId2">
+            <a:extLst>
+              <a:ext uri="{28A0092B-C50C-407E-A947-70E740481C1C}">
+                <a14:useLocalDpi xmlns:a14="http://schemas.microsoft.com/office/drawing/2010/main" val="0"/>
+              </a:ext>
+            </a:extLst>
+          </a:blip>
+          <a:stretch>
+            <a:fillRect/>
+          </a:stretch>
+        </p:blipFill>
+        <p:spPr bwMode="auto">
+          <a:xfrm>
+            <a:off x="3213124" y="1358871"/>
+            <a:ext cx="2331190" cy="2343158"/>
+          </a:xfrm>
+          <a:prstGeom prst="rect">
+            <a:avLst/>
+          </a:prstGeom>
+          <a:noFill/>
+        </p:spPr>
+      </p:pic>
+      <p:pic>
+        <p:nvPicPr>
+          <p:cNvPr id="4" name="Content Placeholder 3" descr="C:\Users\karan\AppData\Local\Microsoft\Windows\INetCache\Content.MSO\31119C9E.tmp">
+            <a:extLst>
+              <a:ext uri="{FF2B5EF4-FFF2-40B4-BE49-F238E27FC236}">
+                <a16:creationId xmlns:a16="http://schemas.microsoft.com/office/drawing/2014/main" id="{9F4025E3-916D-4E07-9F7F-32209E7D4F40}"/>
+              </a:ext>
+            </a:extLst>
+          </p:cNvPr>
+          <p:cNvPicPr>
+            <a:picLocks noGrp="1"/>
+          </p:cNvPicPr>
+          <p:nvPr>
+            <p:ph idx="1"/>
+          </p:nvPr>
+        </p:nvPicPr>
+        <p:blipFill>
+          <a:blip r:embed="rId3">
+            <a:extLst>
+              <a:ext uri="{28A0092B-C50C-407E-A947-70E740481C1C}">
+                <a14:useLocalDpi xmlns:a14="http://schemas.microsoft.com/office/drawing/2010/main" val="0"/>
+              </a:ext>
+            </a:extLst>
+          </a:blip>
+          <a:stretch>
+            <a:fillRect/>
+          </a:stretch>
+        </p:blipFill>
+        <p:spPr bwMode="auto">
+          <a:xfrm>
+            <a:off x="921813" y="1358871"/>
+            <a:ext cx="2322522" cy="2295197"/>
+          </a:xfrm>
+          <a:prstGeom prst="rect">
+            <a:avLst/>
+          </a:prstGeom>
+          <a:noFill/>
+        </p:spPr>
+      </p:pic>
+      <p:sp>
+        <p:nvSpPr>
+          <p:cNvPr id="20" name="Freeform 6">
+            <a:extLst>
+              <a:ext uri="{FF2B5EF4-FFF2-40B4-BE49-F238E27FC236}">
+                <a16:creationId xmlns:a16="http://schemas.microsoft.com/office/drawing/2014/main" id="{3E5C639E-7A0B-46B2-9273-986E8BE7F119}"/>
+              </a:ext>
+              <a:ext uri="{C183D7F6-B498-43B3-948B-1728B52AA6E4}">
+                <adec:decorative xmlns:adec="http://schemas.microsoft.com/office/drawing/2017/decorative" val="1"/>
+              </a:ext>
+            </a:extLst>
+          </p:cNvPr>
+          <p:cNvSpPr>
+            <a:spLocks noGrp="1" noRot="1" noChangeAspect="1" noMove="1" noResize="1" noEditPoints="1" noAdjustHandles="1" noChangeArrowheads="1" noChangeShapeType="1" noTextEdit="1"/>
+          </p:cNvSpPr>
+          <p:nvPr>
+            <p:extLst>
+              <p:ext uri="{386F3935-93C4-4BCD-93E2-E3B085C9AB24}">
+                <p16:designElem xmlns:p16="http://schemas.microsoft.com/office/powerpoint/2015/main" val="1"/>
+              </p:ext>
+            </p:extLst>
+          </p:nvPr>
+        </p:nvSpPr>
+        <p:spPr bwMode="auto">
+          <a:xfrm rot="5400000" flipV="1">
+            <a:off x="7838485" y="614084"/>
+            <a:ext cx="3275013" cy="4408488"/>
+          </a:xfrm>
+          <a:custGeom>
+            <a:avLst/>
+            <a:gdLst/>
+            <a:ahLst/>
+            <a:cxnLst/>
+            <a:rect l="l" t="t" r="r" b="b"/>
+            <a:pathLst>
+              <a:path w="10000" h="10000">
+                <a:moveTo>
+                  <a:pt x="8761" y="0"/>
+                </a:moveTo>
+                <a:lnTo>
+                  <a:pt x="10000" y="0"/>
+                </a:lnTo>
+                <a:lnTo>
+                  <a:pt x="10000" y="10000"/>
+                </a:lnTo>
+                <a:lnTo>
+                  <a:pt x="0" y="10000"/>
+                </a:lnTo>
+                <a:lnTo>
+                  <a:pt x="0" y="9126"/>
+                </a:lnTo>
+                <a:lnTo>
+                  <a:pt x="8761" y="9127"/>
+                </a:lnTo>
+                <a:lnTo>
+                  <a:pt x="8761" y="0"/>
+                </a:lnTo>
+                <a:close/>
+              </a:path>
+            </a:pathLst>
+          </a:custGeom>
+          <a:solidFill>
+            <a:schemeClr val="tx2"/>
+          </a:solidFill>
+          <a:ln w="0">
+            <a:noFill/>
+            <a:prstDash val="solid"/>
+            <a:round/>
+            <a:headEnd/>
+            <a:tailEnd/>
+          </a:ln>
+        </p:spPr>
+      </p:sp>
+      <p:pic>
+        <p:nvPicPr>
+          <p:cNvPr id="7" name="Picture 6" descr="C:\Users\karan\AppData\Local\Microsoft\Windows\INetCache\Content.MSO\BF2A923F.tmp">
+            <a:extLst>
+              <a:ext uri="{FF2B5EF4-FFF2-40B4-BE49-F238E27FC236}">
+                <a16:creationId xmlns:a16="http://schemas.microsoft.com/office/drawing/2014/main" id="{DDB39AF4-03AB-4A2E-AE00-E1C94839ACED}"/>
+              </a:ext>
+            </a:extLst>
+          </p:cNvPr>
+          <p:cNvPicPr/>
+          <p:nvPr/>
+        </p:nvPicPr>
+        <p:blipFill>
+          <a:blip r:embed="rId4">
+            <a:extLst>
+              <a:ext uri="{28A0092B-C50C-407E-A947-70E740481C1C}">
+                <a14:useLocalDpi xmlns:a14="http://schemas.microsoft.com/office/drawing/2010/main" val="0"/>
+              </a:ext>
+            </a:extLst>
+          </a:blip>
+          <a:stretch>
+            <a:fillRect/>
+          </a:stretch>
+        </p:blipFill>
+        <p:spPr bwMode="auto">
+          <a:xfrm>
+            <a:off x="7879692" y="1597865"/>
+            <a:ext cx="3275012" cy="1831135"/>
+          </a:xfrm>
+          <a:prstGeom prst="rect">
+            <a:avLst/>
+          </a:prstGeom>
+          <a:noFill/>
+        </p:spPr>
+      </p:pic>
+      <p:pic>
+        <p:nvPicPr>
+          <p:cNvPr id="5" name="Picture 4" descr="C:\Users\karan\AppData\Local\Microsoft\Windows\INetCache\Content.MSO\1BE16AD.tmp">
+            <a:extLst>
+              <a:ext uri="{FF2B5EF4-FFF2-40B4-BE49-F238E27FC236}">
+                <a16:creationId xmlns:a16="http://schemas.microsoft.com/office/drawing/2014/main" id="{686FE241-3C81-412D-A796-E1D625B5952D}"/>
+              </a:ext>
+            </a:extLst>
+          </p:cNvPr>
+          <p:cNvPicPr/>
+          <p:nvPr/>
+        </p:nvPicPr>
+        <p:blipFill>
+          <a:blip r:embed="rId5">
+            <a:extLst>
+              <a:ext uri="{28A0092B-C50C-407E-A947-70E740481C1C}">
+                <a14:useLocalDpi xmlns:a14="http://schemas.microsoft.com/office/drawing/2010/main" val="0"/>
+              </a:ext>
+            </a:extLst>
+          </a:blip>
+          <a:stretch>
+            <a:fillRect/>
+          </a:stretch>
+        </p:blipFill>
+        <p:spPr bwMode="auto">
+          <a:xfrm>
+            <a:off x="5548502" y="1375406"/>
+            <a:ext cx="2331190" cy="2303764"/>
+          </a:xfrm>
+          <a:prstGeom prst="rect">
+            <a:avLst/>
+          </a:prstGeom>
+          <a:noFill/>
+        </p:spPr>
+      </p:pic>
+    </p:spTree>
+    <p:extLst>
+      <p:ext uri="{BB962C8B-B14F-4D97-AF65-F5344CB8AC3E}">
+        <p14:creationId xmlns:p14="http://schemas.microsoft.com/office/powerpoint/2010/main" val="3962710087"/>
+      </p:ext>
+    </p:extLst>
+  </p:cSld>
+  <p:clrMapOvr>
+    <a:masterClrMapping/>
+  </p:clrMapOvr>
+</p:sld>
+</file>
+
+<file path=ppt/slides/slide7.xml><?xml version="1.0" encoding="utf-8"?>
 <p:sld xmlns:a="http://schemas.openxmlformats.org/drawingml/2006/main" xmlns:r="http://schemas.openxmlformats.org/officeDocument/2006/relationships" xmlns:p="http://schemas.openxmlformats.org/presentationml/2006/main">
   <p:cSld>
     <p:bg>
@@ -5788,9 +7552,17 @@
 </p:sld>
 </file>
 
-<file path=ppt/slides/slide7.xml><?xml version="1.0" encoding="utf-8"?>
+<file path=ppt/slides/slide8.xml><?xml version="1.0" encoding="utf-8"?>
 <p:sld xmlns:a="http://schemas.openxmlformats.org/drawingml/2006/main" xmlns:r="http://schemas.openxmlformats.org/officeDocument/2006/relationships" xmlns:p="http://schemas.openxmlformats.org/presentationml/2006/main">
   <p:cSld>
+    <p:bg>
+      <p:bgPr>
+        <a:solidFill>
+          <a:schemeClr val="bg2"/>
+        </a:solidFill>
+        <a:effectLst/>
+      </p:bgPr>
+    </p:bg>
     <p:spTree>
       <p:nvGrpSpPr>
         <p:cNvPr id="1" name=""/>
@@ -5805,6 +7577,66 @@
           <a:chExt cx="0" cy="0"/>
         </a:xfrm>
       </p:grpSpPr>
+      <p:sp useBgFill="1">
+        <p:nvSpPr>
+          <p:cNvPr id="13" name="Rectangle 12">
+            <a:extLst>
+              <a:ext uri="{FF2B5EF4-FFF2-40B4-BE49-F238E27FC236}">
+                <a16:creationId xmlns:a16="http://schemas.microsoft.com/office/drawing/2014/main" id="{48C110B4-D26A-44C6-8576-236CA24E98C1}"/>
+              </a:ext>
+              <a:ext uri="{C183D7F6-B498-43B3-948B-1728B52AA6E4}">
+                <adec:decorative xmlns:adec="http://schemas.microsoft.com/office/drawing/2017/decorative" val="1"/>
+              </a:ext>
+            </a:extLst>
+          </p:cNvPr>
+          <p:cNvSpPr>
+            <a:spLocks noGrp="1" noRot="1" noChangeAspect="1" noMove="1" noResize="1" noEditPoints="1" noAdjustHandles="1" noChangeArrowheads="1" noChangeShapeType="1" noTextEdit="1"/>
+          </p:cNvSpPr>
+          <p:nvPr>
+            <p:extLst>
+              <p:ext uri="{386F3935-93C4-4BCD-93E2-E3B085C9AB24}">
+                <p16:designElem xmlns:p16="http://schemas.microsoft.com/office/powerpoint/2015/main" val="1"/>
+              </p:ext>
+            </p:extLst>
+          </p:nvPr>
+        </p:nvSpPr>
+        <p:spPr>
+          <a:xfrm>
+            <a:off x="0" y="0"/>
+            <a:ext cx="12188952" cy="6858000"/>
+          </a:xfrm>
+          <a:prstGeom prst="rect">
+            <a:avLst/>
+          </a:prstGeom>
+          <a:ln>
+            <a:noFill/>
+          </a:ln>
+        </p:spPr>
+        <p:style>
+          <a:lnRef idx="2">
+            <a:schemeClr val="accent1">
+              <a:shade val="50000"/>
+            </a:schemeClr>
+          </a:lnRef>
+          <a:fillRef idx="1">
+            <a:schemeClr val="accent1"/>
+          </a:fillRef>
+          <a:effectRef idx="0">
+            <a:schemeClr val="accent1"/>
+          </a:effectRef>
+          <a:fontRef idx="minor">
+            <a:schemeClr val="lt1"/>
+          </a:fontRef>
+        </p:style>
+        <p:txBody>
+          <a:bodyPr rtlCol="0" anchor="ctr"/>
+          <a:lstStyle/>
+          <a:p>
+            <a:pPr algn="ctr"/>
+            <a:endParaRPr lang="en-US"/>
+          </a:p>
+        </p:txBody>
+      </p:sp>
       <p:sp>
         <p:nvSpPr>
           <p:cNvPr id="2" name="Title 1">
@@ -5821,24 +7653,208 @@
             <p:ph type="title"/>
           </p:nvPr>
         </p:nvSpPr>
-        <p:spPr/>
-        <p:txBody>
-          <a:bodyPr/>
+        <p:spPr>
+          <a:xfrm>
+            <a:off x="1021750" y="4531058"/>
+            <a:ext cx="4913384" cy="1683474"/>
+          </a:xfrm>
+        </p:spPr>
+        <p:txBody>
+          <a:bodyPr>
+            <a:normAutofit/>
+          </a:bodyPr>
           <a:lstStyle/>
           <a:p>
-            <a:endParaRPr lang="en-US"/>
-          </a:p>
-        </p:txBody>
-      </p:sp>
-      <p:sp>
-        <p:nvSpPr>
-          <p:cNvPr id="3" name="Content Placeholder 2">
+            <a:r>
+              <a:rPr lang="en-US" dirty="0"/>
+              <a:t>Base Model Success</a:t>
+            </a:r>
+          </a:p>
+        </p:txBody>
+      </p:sp>
+      <p:pic>
+        <p:nvPicPr>
+          <p:cNvPr id="8" name="Content Placeholder 3" descr="A screenshot of a social media post&#10;&#10;Description automatically generated">
             <a:extLst>
               <a:ext uri="{FF2B5EF4-FFF2-40B4-BE49-F238E27FC236}">
-                <a16:creationId xmlns:a16="http://schemas.microsoft.com/office/drawing/2014/main" id="{01FAF772-3588-4604-BC21-1684FEF99C6C}"/>
+                <a16:creationId xmlns:a16="http://schemas.microsoft.com/office/drawing/2014/main" id="{6D6847A0-E536-4303-A474-7929B54AE221}"/>
               </a:ext>
             </a:extLst>
           </p:cNvPr>
+          <p:cNvPicPr>
+            <a:picLocks/>
+          </p:cNvPicPr>
+          <p:nvPr/>
+        </p:nvPicPr>
+        <p:blipFill rotWithShape="1">
+          <a:blip r:embed="rId2">
+            <a:extLst>
+              <a:ext uri="{28A0092B-C50C-407E-A947-70E740481C1C}">
+                <a14:useLocalDpi xmlns:a14="http://schemas.microsoft.com/office/drawing/2010/main" val="0"/>
+              </a:ext>
+            </a:extLst>
+          </a:blip>
+          <a:srcRect r="2" b="3227"/>
+          <a:stretch/>
+        </p:blipFill>
+        <p:spPr>
+          <a:xfrm>
+            <a:off x="1" y="10"/>
+            <a:ext cx="6050279" cy="3732653"/>
+          </a:xfrm>
+          <a:prstGeom prst="rect">
+            <a:avLst/>
+          </a:prstGeom>
+        </p:spPr>
+      </p:pic>
+      <p:pic>
+        <p:nvPicPr>
+          <p:cNvPr id="5" name="Picture 4" descr="A screenshot of a social media post&#10;&#10;Description automatically generated">
+            <a:extLst>
+              <a:ext uri="{FF2B5EF4-FFF2-40B4-BE49-F238E27FC236}">
+                <a16:creationId xmlns:a16="http://schemas.microsoft.com/office/drawing/2014/main" id="{EBC2A8F4-A1BB-4642-ADBE-A8DE645023A2}"/>
+              </a:ext>
+            </a:extLst>
+          </p:cNvPr>
+          <p:cNvPicPr/>
+          <p:nvPr/>
+        </p:nvPicPr>
+        <p:blipFill rotWithShape="1">
+          <a:blip r:embed="rId3">
+            <a:extLst>
+              <a:ext uri="{28A0092B-C50C-407E-A947-70E740481C1C}">
+                <a14:useLocalDpi xmlns:a14="http://schemas.microsoft.com/office/drawing/2010/main" val="0"/>
+              </a:ext>
+            </a:extLst>
+          </a:blip>
+          <a:srcRect r="2" b="7577"/>
+          <a:stretch/>
+        </p:blipFill>
+        <p:spPr>
+          <a:xfrm>
+            <a:off x="6138672" y="10"/>
+            <a:ext cx="6050280" cy="3732653"/>
+          </a:xfrm>
+          <a:prstGeom prst="rect">
+            <a:avLst/>
+          </a:prstGeom>
+        </p:spPr>
+      </p:pic>
+      <p:sp>
+        <p:nvSpPr>
+          <p:cNvPr id="15" name="Freeform: Shape 14">
+            <a:extLst>
+              <a:ext uri="{FF2B5EF4-FFF2-40B4-BE49-F238E27FC236}">
+                <a16:creationId xmlns:a16="http://schemas.microsoft.com/office/drawing/2014/main" id="{5BFD4DBB-3229-4DF6-A68A-CD91F8325879}"/>
+              </a:ext>
+              <a:ext uri="{C183D7F6-B498-43B3-948B-1728B52AA6E4}">
+                <adec:decorative xmlns:adec="http://schemas.microsoft.com/office/drawing/2017/decorative" val="1"/>
+              </a:ext>
+            </a:extLst>
+          </p:cNvPr>
+          <p:cNvSpPr>
+            <a:spLocks noGrp="1" noRot="1" noChangeAspect="1" noMove="1" noResize="1" noEditPoints="1" noAdjustHandles="1" noChangeArrowheads="1" noChangeShapeType="1" noTextEdit="1"/>
+          </p:cNvSpPr>
+          <p:nvPr>
+            <p:extLst>
+              <p:ext uri="{386F3935-93C4-4BCD-93E2-E3B085C9AB24}">
+                <p16:designElem xmlns:p16="http://schemas.microsoft.com/office/powerpoint/2015/main" val="1"/>
+              </p:ext>
+            </p:extLst>
+          </p:nvPr>
+        </p:nvSpPr>
+        <p:spPr bwMode="auto">
+          <a:xfrm flipH="1" flipV="1">
+            <a:off x="434936" y="4030294"/>
+            <a:ext cx="1957171" cy="1103687"/>
+          </a:xfrm>
+          <a:custGeom>
+            <a:avLst/>
+            <a:gdLst>
+              <a:gd name="connsiteX0" fmla="*/ 2017702 w 2017702"/>
+              <a:gd name="connsiteY0" fmla="*/ 1137821 h 1137821"/>
+              <a:gd name="connsiteX1" fmla="*/ 404 w 2017702"/>
+              <a:gd name="connsiteY1" fmla="*/ 1137821 h 1137821"/>
+              <a:gd name="connsiteX2" fmla="*/ 0 w 2017702"/>
+              <a:gd name="connsiteY2" fmla="*/ 900216 h 1137821"/>
+              <a:gd name="connsiteX3" fmla="*/ 1767759 w 2017702"/>
+              <a:gd name="connsiteY3" fmla="*/ 901031 h 1137821"/>
+              <a:gd name="connsiteX4" fmla="*/ 1767759 w 2017702"/>
+              <a:gd name="connsiteY4" fmla="*/ 0 h 1137821"/>
+              <a:gd name="connsiteX5" fmla="*/ 2017702 w 2017702"/>
+              <a:gd name="connsiteY5" fmla="*/ 0 h 1137821"/>
+            </a:gdLst>
+            <a:ahLst/>
+            <a:cxnLst>
+              <a:cxn ang="0">
+                <a:pos x="connsiteX0" y="connsiteY0"/>
+              </a:cxn>
+              <a:cxn ang="0">
+                <a:pos x="connsiteX1" y="connsiteY1"/>
+              </a:cxn>
+              <a:cxn ang="0">
+                <a:pos x="connsiteX2" y="connsiteY2"/>
+              </a:cxn>
+              <a:cxn ang="0">
+                <a:pos x="connsiteX3" y="connsiteY3"/>
+              </a:cxn>
+              <a:cxn ang="0">
+                <a:pos x="connsiteX4" y="connsiteY4"/>
+              </a:cxn>
+              <a:cxn ang="0">
+                <a:pos x="connsiteX5" y="connsiteY5"/>
+              </a:cxn>
+            </a:cxnLst>
+            <a:rect l="l" t="t" r="r" b="b"/>
+            <a:pathLst>
+              <a:path w="2017702" h="1137821">
+                <a:moveTo>
+                  <a:pt x="2017702" y="1137821"/>
+                </a:moveTo>
+                <a:lnTo>
+                  <a:pt x="404" y="1137821"/>
+                </a:lnTo>
+                <a:cubicBezTo>
+                  <a:pt x="-404" y="1055814"/>
+                  <a:pt x="807" y="982224"/>
+                  <a:pt x="0" y="900216"/>
+                </a:cubicBezTo>
+                <a:lnTo>
+                  <a:pt x="1767759" y="901031"/>
+                </a:lnTo>
+                <a:lnTo>
+                  <a:pt x="1767759" y="0"/>
+                </a:lnTo>
+                <a:lnTo>
+                  <a:pt x="2017702" y="0"/>
+                </a:lnTo>
+                <a:close/>
+              </a:path>
+            </a:pathLst>
+          </a:custGeom>
+          <a:solidFill>
+            <a:schemeClr val="tx2">
+              <a:alpha val="80000"/>
+            </a:schemeClr>
+          </a:solidFill>
+          <a:ln w="0">
+            <a:noFill/>
+            <a:prstDash val="solid"/>
+            <a:round/>
+            <a:headEnd/>
+            <a:tailEnd/>
+          </a:ln>
+        </p:spPr>
+      </p:sp>
+      <p:sp>
+        <p:nvSpPr>
+          <p:cNvPr id="10" name="Content Placeholder 9">
+            <a:extLst>
+              <a:ext uri="{FF2B5EF4-FFF2-40B4-BE49-F238E27FC236}">
+                <a16:creationId xmlns:a16="http://schemas.microsoft.com/office/drawing/2014/main" id="{1F2297C2-9F7A-4B32-BBF1-F1AC54A4CD5B}"/>
+              </a:ext>
+            </a:extLst>
+          </p:cNvPr>
           <p:cNvSpPr>
             <a:spLocks noGrp="1"/>
           </p:cNvSpPr>
@@ -5846,14 +7862,136 @@
             <p:ph idx="1"/>
           </p:nvPr>
         </p:nvSpPr>
-        <p:spPr/>
-        <p:txBody>
-          <a:bodyPr/>
+        <p:spPr>
+          <a:xfrm>
+            <a:off x="6253810" y="4531059"/>
+            <a:ext cx="4718989" cy="1683474"/>
+          </a:xfrm>
+        </p:spPr>
+        <p:txBody>
+          <a:bodyPr>
+            <a:normAutofit/>
+          </a:bodyPr>
           <a:lstStyle/>
           <a:p>
-            <a:endParaRPr lang="en-US"/>
-          </a:p>
-        </p:txBody>
+            <a:r>
+              <a:rPr lang="en-US" sz="1800" dirty="0"/>
+              <a:t>85% acc training</a:t>
+            </a:r>
+          </a:p>
+          <a:p>
+            <a:r>
+              <a:rPr lang="en-US" sz="1800" dirty="0"/>
+              <a:t>67% acc test</a:t>
+            </a:r>
+          </a:p>
+        </p:txBody>
+      </p:sp>
+      <p:sp>
+        <p:nvSpPr>
+          <p:cNvPr id="17" name="Freeform: Shape 16">
+            <a:extLst>
+              <a:ext uri="{FF2B5EF4-FFF2-40B4-BE49-F238E27FC236}">
+                <a16:creationId xmlns:a16="http://schemas.microsoft.com/office/drawing/2014/main" id="{792979E5-1F93-4CE3-975E-3CAEC618BFB3}"/>
+              </a:ext>
+              <a:ext uri="{C183D7F6-B498-43B3-948B-1728B52AA6E4}">
+                <adec:decorative xmlns:adec="http://schemas.microsoft.com/office/drawing/2017/decorative" val="1"/>
+              </a:ext>
+            </a:extLst>
+          </p:cNvPr>
+          <p:cNvSpPr>
+            <a:spLocks noGrp="1" noRot="1" noChangeAspect="1" noMove="1" noResize="1" noEditPoints="1" noAdjustHandles="1" noChangeArrowheads="1" noChangeShapeType="1" noTextEdit="1"/>
+          </p:cNvSpPr>
+          <p:nvPr>
+            <p:extLst>
+              <p:ext uri="{386F3935-93C4-4BCD-93E2-E3B085C9AB24}">
+                <p16:designElem xmlns:p16="http://schemas.microsoft.com/office/powerpoint/2015/main" val="1"/>
+              </p:ext>
+            </p:extLst>
+          </p:nvPr>
+        </p:nvSpPr>
+        <p:spPr bwMode="auto">
+          <a:xfrm>
+            <a:off x="9796837" y="5311230"/>
+            <a:ext cx="2042265" cy="1213486"/>
+          </a:xfrm>
+          <a:custGeom>
+            <a:avLst/>
+            <a:gdLst>
+              <a:gd name="connsiteX0" fmla="*/ 1844618 w 2105428"/>
+              <a:gd name="connsiteY0" fmla="*/ 0 h 1251016"/>
+              <a:gd name="connsiteX1" fmla="*/ 2105428 w 2105428"/>
+              <a:gd name="connsiteY1" fmla="*/ 0 h 1251016"/>
+              <a:gd name="connsiteX2" fmla="*/ 2105428 w 2105428"/>
+              <a:gd name="connsiteY2" fmla="*/ 1251016 h 1251016"/>
+              <a:gd name="connsiteX3" fmla="*/ 421 w 2105428"/>
+              <a:gd name="connsiteY3" fmla="*/ 1251016 h 1251016"/>
+              <a:gd name="connsiteX4" fmla="*/ 0 w 2105428"/>
+              <a:gd name="connsiteY4" fmla="*/ 1003081 h 1251016"/>
+              <a:gd name="connsiteX5" fmla="*/ 1844618 w 2105428"/>
+              <a:gd name="connsiteY5" fmla="*/ 1003931 h 1251016"/>
+            </a:gdLst>
+            <a:ahLst/>
+            <a:cxnLst>
+              <a:cxn ang="0">
+                <a:pos x="connsiteX0" y="connsiteY0"/>
+              </a:cxn>
+              <a:cxn ang="0">
+                <a:pos x="connsiteX1" y="connsiteY1"/>
+              </a:cxn>
+              <a:cxn ang="0">
+                <a:pos x="connsiteX2" y="connsiteY2"/>
+              </a:cxn>
+              <a:cxn ang="0">
+                <a:pos x="connsiteX3" y="connsiteY3"/>
+              </a:cxn>
+              <a:cxn ang="0">
+                <a:pos x="connsiteX4" y="connsiteY4"/>
+              </a:cxn>
+              <a:cxn ang="0">
+                <a:pos x="connsiteX5" y="connsiteY5"/>
+              </a:cxn>
+            </a:cxnLst>
+            <a:rect l="l" t="t" r="r" b="b"/>
+            <a:pathLst>
+              <a:path w="2105428" h="1251016">
+                <a:moveTo>
+                  <a:pt x="1844618" y="0"/>
+                </a:moveTo>
+                <a:lnTo>
+                  <a:pt x="2105428" y="0"/>
+                </a:lnTo>
+                <a:lnTo>
+                  <a:pt x="2105428" y="1251016"/>
+                </a:lnTo>
+                <a:lnTo>
+                  <a:pt x="421" y="1251016"/>
+                </a:lnTo>
+                <a:cubicBezTo>
+                  <a:pt x="-421" y="1165443"/>
+                  <a:pt x="842" y="1088654"/>
+                  <a:pt x="0" y="1003081"/>
+                </a:cubicBezTo>
+                <a:lnTo>
+                  <a:pt x="1844618" y="1003931"/>
+                </a:lnTo>
+                <a:close/>
+              </a:path>
+            </a:pathLst>
+          </a:custGeom>
+          <a:solidFill>
+            <a:schemeClr val="tx2">
+              <a:alpha val="80000"/>
+            </a:schemeClr>
+          </a:solidFill>
+          <a:ln w="0">
+            <a:noFill/>
+            <a:prstDash val="solid"/>
+            <a:round/>
+            <a:headEnd/>
+            <a:tailEnd/>
+          </a:ln>
+        </p:spPr>
       </p:sp>
     </p:spTree>
     <p:extLst>
@@ -5868,9 +8006,17 @@
 </p:sld>
 </file>
 
-<file path=ppt/slides/slide8.xml><?xml version="1.0" encoding="utf-8"?>
+<file path=ppt/slides/slide9.xml><?xml version="1.0" encoding="utf-8"?>
 <p:sld xmlns:a="http://schemas.openxmlformats.org/drawingml/2006/main" xmlns:r="http://schemas.openxmlformats.org/officeDocument/2006/relationships" xmlns:p="http://schemas.openxmlformats.org/presentationml/2006/main">
   <p:cSld>
+    <p:bg>
+      <p:bgPr>
+        <a:solidFill>
+          <a:schemeClr val="bg2"/>
+        </a:solidFill>
+        <a:effectLst/>
+      </p:bgPr>
+    </p:bg>
     <p:spTree>
       <p:nvGrpSpPr>
         <p:cNvPr id="1" name=""/>
@@ -5885,6 +8031,242 @@
           <a:chExt cx="0" cy="0"/>
         </a:xfrm>
       </p:grpSpPr>
+      <p:grpSp>
+        <p:nvGrpSpPr>
+          <p:cNvPr id="24" name="Group 10">
+            <a:extLst>
+              <a:ext uri="{FF2B5EF4-FFF2-40B4-BE49-F238E27FC236}">
+                <a16:creationId xmlns:a16="http://schemas.microsoft.com/office/drawing/2014/main" id="{57500303-A207-4812-BEB9-51E132FEB73F}"/>
+              </a:ext>
+              <a:ext uri="{C183D7F6-B498-43B3-948B-1728B52AA6E4}">
+                <adec:decorative xmlns:adec="http://schemas.microsoft.com/office/drawing/2017/decorative" val="1"/>
+              </a:ext>
+            </a:extLst>
+          </p:cNvPr>
+          <p:cNvGrpSpPr>
+            <a:grpSpLocks noGrp="1" noUngrp="1" noRot="1" noChangeAspect="1" noMove="1" noResize="1"/>
+          </p:cNvGrpSpPr>
+          <p:nvPr>
+            <p:extLst>
+              <p:ext uri="{386F3935-93C4-4BCD-93E2-E3B085C9AB24}">
+                <p16:designElem xmlns:p16="http://schemas.microsoft.com/office/powerpoint/2015/main" val="1"/>
+              </p:ext>
+            </p:extLst>
+          </p:nvPr>
+        </p:nvGrpSpPr>
+        <p:grpSpPr>
+          <a:xfrm>
+            <a:off x="752858" y="744469"/>
+            <a:ext cx="10674117" cy="5349671"/>
+            <a:chOff x="752858" y="744469"/>
+            <a:chExt cx="10674117" cy="5349671"/>
+          </a:xfrm>
+        </p:grpSpPr>
+        <p:sp>
+          <p:nvSpPr>
+            <p:cNvPr id="12" name="Freeform 6">
+              <a:extLst>
+                <a:ext uri="{FF2B5EF4-FFF2-40B4-BE49-F238E27FC236}">
+                  <a16:creationId xmlns:a16="http://schemas.microsoft.com/office/drawing/2014/main" id="{10118C91-C025-4776-BE95-E9926378E790}"/>
+                </a:ext>
+                <a:ext uri="{C183D7F6-B498-43B3-948B-1728B52AA6E4}">
+                  <adec:decorative xmlns:adec="http://schemas.microsoft.com/office/drawing/2017/decorative" val="1"/>
+                </a:ext>
+              </a:extLst>
+            </p:cNvPr>
+            <p:cNvSpPr/>
+            <p:nvPr>
+              <p:extLst>
+                <p:ext uri="{386F3935-93C4-4BCD-93E2-E3B085C9AB24}">
+                  <p16:designElem xmlns:p16="http://schemas.microsoft.com/office/powerpoint/2015/main" val="1"/>
+                </p:ext>
+              </p:extLst>
+            </p:nvPr>
+          </p:nvSpPr>
+          <p:spPr bwMode="auto">
+            <a:xfrm>
+              <a:off x="8151962" y="1685652"/>
+              <a:ext cx="3275013" cy="4408488"/>
+            </a:xfrm>
+            <a:custGeom>
+              <a:avLst/>
+              <a:gdLst/>
+              <a:ahLst/>
+              <a:cxnLst/>
+              <a:rect l="l" t="t" r="r" b="b"/>
+              <a:pathLst>
+                <a:path w="10000" h="10000">
+                  <a:moveTo>
+                    <a:pt x="8761" y="0"/>
+                  </a:moveTo>
+                  <a:lnTo>
+                    <a:pt x="10000" y="0"/>
+                  </a:lnTo>
+                  <a:lnTo>
+                    <a:pt x="10000" y="10000"/>
+                  </a:lnTo>
+                  <a:lnTo>
+                    <a:pt x="0" y="10000"/>
+                  </a:lnTo>
+                  <a:lnTo>
+                    <a:pt x="0" y="9126"/>
+                  </a:lnTo>
+                  <a:lnTo>
+                    <a:pt x="8761" y="9127"/>
+                  </a:lnTo>
+                  <a:lnTo>
+                    <a:pt x="8761" y="0"/>
+                  </a:lnTo>
+                  <a:close/>
+                </a:path>
+              </a:pathLst>
+            </a:custGeom>
+            <a:solidFill>
+              <a:schemeClr val="tx2"/>
+            </a:solidFill>
+            <a:ln w="0">
+              <a:noFill/>
+              <a:prstDash val="solid"/>
+              <a:round/>
+              <a:headEnd/>
+              <a:tailEnd/>
+            </a:ln>
+          </p:spPr>
+        </p:sp>
+        <p:sp>
+          <p:nvSpPr>
+            <p:cNvPr id="13" name="Freeform 6">
+              <a:extLst>
+                <a:ext uri="{FF2B5EF4-FFF2-40B4-BE49-F238E27FC236}">
+                  <a16:creationId xmlns:a16="http://schemas.microsoft.com/office/drawing/2014/main" id="{339174D0-30E8-4BBF-BF81-5DDAC33C0C0E}"/>
+                </a:ext>
+                <a:ext uri="{C183D7F6-B498-43B3-948B-1728B52AA6E4}">
+                  <adec:decorative xmlns:adec="http://schemas.microsoft.com/office/drawing/2017/decorative" val="1"/>
+                </a:ext>
+              </a:extLst>
+            </p:cNvPr>
+            <p:cNvSpPr/>
+            <p:nvPr>
+              <p:extLst>
+                <p:ext uri="{386F3935-93C4-4BCD-93E2-E3B085C9AB24}">
+                  <p16:designElem xmlns:p16="http://schemas.microsoft.com/office/powerpoint/2015/main" val="1"/>
+                </p:ext>
+              </p:extLst>
+            </p:nvPr>
+          </p:nvSpPr>
+          <p:spPr bwMode="auto">
+            <a:xfrm flipH="1" flipV="1">
+              <a:off x="752858" y="744469"/>
+              <a:ext cx="3275668" cy="4408488"/>
+            </a:xfrm>
+            <a:custGeom>
+              <a:avLst/>
+              <a:gdLst/>
+              <a:ahLst/>
+              <a:cxnLst/>
+              <a:rect l="l" t="t" r="r" b="b"/>
+              <a:pathLst>
+                <a:path w="10002" h="10000">
+                  <a:moveTo>
+                    <a:pt x="8763" y="0"/>
+                  </a:moveTo>
+                  <a:lnTo>
+                    <a:pt x="10002" y="0"/>
+                  </a:lnTo>
+                  <a:lnTo>
+                    <a:pt x="10002" y="10000"/>
+                  </a:lnTo>
+                  <a:lnTo>
+                    <a:pt x="2" y="10000"/>
+                  </a:lnTo>
+                  <a:cubicBezTo>
+                    <a:pt x="-2" y="9698"/>
+                    <a:pt x="4" y="9427"/>
+                    <a:pt x="0" y="9125"/>
+                  </a:cubicBezTo>
+                  <a:lnTo>
+                    <a:pt x="8763" y="9128"/>
+                  </a:lnTo>
+                  <a:lnTo>
+                    <a:pt x="8763" y="0"/>
+                  </a:lnTo>
+                  <a:close/>
+                </a:path>
+              </a:pathLst>
+            </a:custGeom>
+            <a:solidFill>
+              <a:schemeClr val="tx2"/>
+            </a:solidFill>
+            <a:ln w="0">
+              <a:noFill/>
+              <a:prstDash val="solid"/>
+              <a:round/>
+              <a:headEnd/>
+              <a:tailEnd/>
+            </a:ln>
+          </p:spPr>
+        </p:sp>
+      </p:grpSp>
+      <p:sp useBgFill="1">
+        <p:nvSpPr>
+          <p:cNvPr id="15" name="Rectangle 14">
+            <a:extLst>
+              <a:ext uri="{FF2B5EF4-FFF2-40B4-BE49-F238E27FC236}">
+                <a16:creationId xmlns:a16="http://schemas.microsoft.com/office/drawing/2014/main" id="{AAC11200-8B97-4CB4-99EF-7C0FA210F2C4}"/>
+              </a:ext>
+              <a:ext uri="{C183D7F6-B498-43B3-948B-1728B52AA6E4}">
+                <adec:decorative xmlns:adec="http://schemas.microsoft.com/office/drawing/2017/decorative" val="1"/>
+              </a:ext>
+            </a:extLst>
+          </p:cNvPr>
+          <p:cNvSpPr>
+            <a:spLocks noGrp="1" noRot="1" noChangeAspect="1" noMove="1" noResize="1" noEditPoints="1" noAdjustHandles="1" noChangeArrowheads="1" noChangeShapeType="1" noTextEdit="1"/>
+          </p:cNvSpPr>
+          <p:nvPr>
+            <p:extLst>
+              <p:ext uri="{386F3935-93C4-4BCD-93E2-E3B085C9AB24}">
+                <p16:designElem xmlns:p16="http://schemas.microsoft.com/office/powerpoint/2015/main" val="1"/>
+              </p:ext>
+            </p:extLst>
+          </p:nvPr>
+        </p:nvSpPr>
+        <p:spPr>
+          <a:xfrm>
+            <a:off x="-1895" y="0"/>
+            <a:ext cx="12192000" cy="6858000"/>
+          </a:xfrm>
+          <a:prstGeom prst="rect">
+            <a:avLst/>
+          </a:prstGeom>
+          <a:ln>
+            <a:noFill/>
+          </a:ln>
+        </p:spPr>
+        <p:style>
+          <a:lnRef idx="2">
+            <a:schemeClr val="accent1">
+              <a:shade val="50000"/>
+            </a:schemeClr>
+          </a:lnRef>
+          <a:fillRef idx="1001">
+            <a:schemeClr val="lt2"/>
+          </a:fillRef>
+          <a:effectRef idx="0">
+            <a:schemeClr val="accent1"/>
+          </a:effectRef>
+          <a:fontRef idx="minor">
+            <a:schemeClr val="lt1"/>
+          </a:fontRef>
+        </p:style>
+        <p:txBody>
+          <a:bodyPr rtlCol="0" anchor="ctr"/>
+          <a:lstStyle/>
+          <a:p>
+            <a:pPr algn="ctr"/>
+            <a:endParaRPr lang="en-US"/>
+          </a:p>
+        </p:txBody>
+      </p:sp>
       <p:sp>
         <p:nvSpPr>
           <p:cNvPr id="2" name="Title 1">
@@ -5901,37 +8283,313 @@
             <p:ph type="title"/>
           </p:nvPr>
         </p:nvSpPr>
-        <p:spPr/>
-        <p:txBody>
-          <a:bodyPr/>
+        <p:spPr>
+          <a:xfrm>
+            <a:off x="659230" y="4484772"/>
+            <a:ext cx="10869750" cy="1237298"/>
+          </a:xfrm>
+        </p:spPr>
+        <p:txBody>
+          <a:bodyPr vert="horz" lIns="91440" tIns="45720" rIns="91440" bIns="45720" rtlCol="0" anchor="b">
+            <a:normAutofit/>
+          </a:bodyPr>
           <a:lstStyle/>
           <a:p>
-            <a:endParaRPr lang="en-US"/>
-          </a:p>
-        </p:txBody>
-      </p:sp>
-      <p:sp>
-        <p:nvSpPr>
-          <p:cNvPr id="3" name="Content Placeholder 2">
+            <a:pPr algn="ctr"/>
+            <a:r>
+              <a:rPr lang="en-US" sz="5000" cap="all"/>
+              <a:t>Mean Subtraction/Normalization</a:t>
+            </a:r>
+          </a:p>
+        </p:txBody>
+      </p:sp>
+      <p:sp>
+        <p:nvSpPr>
+          <p:cNvPr id="17" name="Freeform 6">
             <a:extLst>
               <a:ext uri="{FF2B5EF4-FFF2-40B4-BE49-F238E27FC236}">
-                <a16:creationId xmlns:a16="http://schemas.microsoft.com/office/drawing/2014/main" id="{00B2C235-CE06-4C78-B898-2C1476ED4E7B}"/>
+                <a16:creationId xmlns:a16="http://schemas.microsoft.com/office/drawing/2014/main" id="{BB502E7E-3C82-47F3-B817-7507C01A1FCD}"/>
+              </a:ext>
+              <a:ext uri="{C183D7F6-B498-43B3-948B-1728B52AA6E4}">
+                <adec:decorative xmlns:adec="http://schemas.microsoft.com/office/drawing/2017/decorative" val="1"/>
               </a:ext>
             </a:extLst>
           </p:cNvPr>
           <p:cNvSpPr>
-            <a:spLocks noGrp="1"/>
-          </p:cNvSpPr>
+            <a:spLocks noGrp="1" noRot="1" noChangeAspect="1" noMove="1" noResize="1" noEditPoints="1" noAdjustHandles="1" noChangeArrowheads="1" noChangeShapeType="1" noTextEdit="1"/>
+          </p:cNvSpPr>
+          <p:nvPr>
+            <p:extLst>
+              <p:ext uri="{386F3935-93C4-4BCD-93E2-E3B085C9AB24}">
+                <p16:designElem xmlns:p16="http://schemas.microsoft.com/office/powerpoint/2015/main" val="1"/>
+              </p:ext>
+            </p:extLst>
+          </p:nvPr>
+        </p:nvSpPr>
+        <p:spPr bwMode="auto">
+          <a:xfrm rot="5400000" flipH="1">
+            <a:off x="1046527" y="-133294"/>
+            <a:ext cx="3275668" cy="4408488"/>
+          </a:xfrm>
+          <a:custGeom>
+            <a:avLst/>
+            <a:gdLst/>
+            <a:ahLst/>
+            <a:cxnLst/>
+            <a:rect l="l" t="t" r="r" b="b"/>
+            <a:pathLst>
+              <a:path w="10002" h="10000">
+                <a:moveTo>
+                  <a:pt x="8763" y="0"/>
+                </a:moveTo>
+                <a:lnTo>
+                  <a:pt x="10002" y="0"/>
+                </a:lnTo>
+                <a:lnTo>
+                  <a:pt x="10002" y="10000"/>
+                </a:lnTo>
+                <a:lnTo>
+                  <a:pt x="2" y="10000"/>
+                </a:lnTo>
+                <a:cubicBezTo>
+                  <a:pt x="-2" y="9698"/>
+                  <a:pt x="4" y="9427"/>
+                  <a:pt x="0" y="9125"/>
+                </a:cubicBezTo>
+                <a:lnTo>
+                  <a:pt x="8763" y="9128"/>
+                </a:lnTo>
+                <a:lnTo>
+                  <a:pt x="8763" y="0"/>
+                </a:lnTo>
+                <a:close/>
+              </a:path>
+            </a:pathLst>
+          </a:custGeom>
+          <a:solidFill>
+            <a:schemeClr val="tx2"/>
+          </a:solidFill>
+          <a:ln w="0">
+            <a:noFill/>
+            <a:prstDash val="solid"/>
+            <a:round/>
+            <a:headEnd/>
+            <a:tailEnd/>
+          </a:ln>
+        </p:spPr>
+      </p:sp>
+      <p:pic>
+        <p:nvPicPr>
+          <p:cNvPr id="5" name="Picture 4" descr="A screenshot of a cell phone&#10;&#10;Description automatically generated">
+            <a:extLst>
+              <a:ext uri="{FF2B5EF4-FFF2-40B4-BE49-F238E27FC236}">
+                <a16:creationId xmlns:a16="http://schemas.microsoft.com/office/drawing/2014/main" id="{406CF6D8-7DD8-4A57-B4BD-C9ADEE49374C}"/>
+              </a:ext>
+            </a:extLst>
+          </p:cNvPr>
+          <p:cNvPicPr/>
+          <p:nvPr/>
+        </p:nvPicPr>
+        <p:blipFill>
+          <a:blip r:embed="rId2">
+            <a:extLst>
+              <a:ext uri="{28A0092B-C50C-407E-A947-70E740481C1C}">
+                <a14:useLocalDpi xmlns:a14="http://schemas.microsoft.com/office/drawing/2010/main" val="0"/>
+              </a:ext>
+            </a:extLst>
+          </a:blip>
+          <a:stretch>
+            <a:fillRect/>
+          </a:stretch>
+        </p:blipFill>
+        <p:spPr>
+          <a:xfrm>
+            <a:off x="1182863" y="1426928"/>
+            <a:ext cx="3078999" cy="2032139"/>
+          </a:xfrm>
+          <a:prstGeom prst="rect">
+            <a:avLst/>
+          </a:prstGeom>
+        </p:spPr>
+      </p:pic>
+      <p:sp>
+        <p:nvSpPr>
+          <p:cNvPr id="19" name="Freeform 6">
+            <a:extLst>
+              <a:ext uri="{FF2B5EF4-FFF2-40B4-BE49-F238E27FC236}">
+                <a16:creationId xmlns:a16="http://schemas.microsoft.com/office/drawing/2014/main" id="{3E5C639E-7A0B-46B2-9273-986E8BE7F119}"/>
+              </a:ext>
+              <a:ext uri="{C183D7F6-B498-43B3-948B-1728B52AA6E4}">
+                <adec:decorative xmlns:adec="http://schemas.microsoft.com/office/drawing/2017/decorative" val="1"/>
+              </a:ext>
+            </a:extLst>
+          </p:cNvPr>
+          <p:cNvSpPr>
+            <a:spLocks noGrp="1" noRot="1" noChangeAspect="1" noMove="1" noResize="1" noEditPoints="1" noAdjustHandles="1" noChangeArrowheads="1" noChangeShapeType="1" noTextEdit="1"/>
+          </p:cNvSpPr>
+          <p:nvPr>
+            <p:extLst>
+              <p:ext uri="{386F3935-93C4-4BCD-93E2-E3B085C9AB24}">
+                <p16:designElem xmlns:p16="http://schemas.microsoft.com/office/powerpoint/2015/main" val="1"/>
+              </p:ext>
+            </p:extLst>
+          </p:nvPr>
+        </p:nvSpPr>
+        <p:spPr bwMode="auto">
+          <a:xfrm rot="5400000" flipV="1">
+            <a:off x="7838485" y="614084"/>
+            <a:ext cx="3275013" cy="4408488"/>
+          </a:xfrm>
+          <a:custGeom>
+            <a:avLst/>
+            <a:gdLst/>
+            <a:ahLst/>
+            <a:cxnLst/>
+            <a:rect l="l" t="t" r="r" b="b"/>
+            <a:pathLst>
+              <a:path w="10000" h="10000">
+                <a:moveTo>
+                  <a:pt x="8761" y="0"/>
+                </a:moveTo>
+                <a:lnTo>
+                  <a:pt x="10000" y="0"/>
+                </a:lnTo>
+                <a:lnTo>
+                  <a:pt x="10000" y="10000"/>
+                </a:lnTo>
+                <a:lnTo>
+                  <a:pt x="0" y="10000"/>
+                </a:lnTo>
+                <a:lnTo>
+                  <a:pt x="0" y="9126"/>
+                </a:lnTo>
+                <a:lnTo>
+                  <a:pt x="8761" y="9127"/>
+                </a:lnTo>
+                <a:lnTo>
+                  <a:pt x="8761" y="0"/>
+                </a:lnTo>
+                <a:close/>
+              </a:path>
+            </a:pathLst>
+          </a:custGeom>
+          <a:solidFill>
+            <a:schemeClr val="tx2"/>
+          </a:solidFill>
+          <a:ln w="0">
+            <a:noFill/>
+            <a:prstDash val="solid"/>
+            <a:round/>
+            <a:headEnd/>
+            <a:tailEnd/>
+          </a:ln>
+        </p:spPr>
+      </p:sp>
+      <p:pic>
+        <p:nvPicPr>
+          <p:cNvPr id="4" name="Content Placeholder 3" descr="A screenshot of a social media post&#10;&#10;Description automatically generated">
+            <a:extLst>
+              <a:ext uri="{FF2B5EF4-FFF2-40B4-BE49-F238E27FC236}">
+                <a16:creationId xmlns:a16="http://schemas.microsoft.com/office/drawing/2014/main" id="{084D8A50-5E42-4763-BF8E-C0D4C8808C17}"/>
+              </a:ext>
+            </a:extLst>
+          </p:cNvPr>
+          <p:cNvPicPr>
+            <a:picLocks noGrp="1"/>
+          </p:cNvPicPr>
           <p:nvPr>
             <p:ph idx="1"/>
           </p:nvPr>
-        </p:nvSpPr>
-        <p:spPr/>
-        <p:txBody>
-          <a:bodyPr/>
+        </p:nvPicPr>
+        <p:blipFill>
+          <a:blip r:embed="rId3">
+            <a:extLst>
+              <a:ext uri="{28A0092B-C50C-407E-A947-70E740481C1C}">
+                <a14:useLocalDpi xmlns:a14="http://schemas.microsoft.com/office/drawing/2010/main" val="0"/>
+              </a:ext>
+            </a:extLst>
+          </a:blip>
+          <a:stretch>
+            <a:fillRect/>
+          </a:stretch>
+        </p:blipFill>
+        <p:spPr>
+          <a:xfrm>
+            <a:off x="4575233" y="1432848"/>
+            <a:ext cx="3049897" cy="2020556"/>
+          </a:xfrm>
+          <a:prstGeom prst="rect">
+            <a:avLst/>
+          </a:prstGeom>
+        </p:spPr>
+      </p:pic>
+      <p:pic>
+        <p:nvPicPr>
+          <p:cNvPr id="6" name="Picture 5" descr="C:\Users\karan\AppData\Local\Microsoft\Windows\INetCache\Content.MSO\A0284CC4.tmp">
+            <a:extLst>
+              <a:ext uri="{FF2B5EF4-FFF2-40B4-BE49-F238E27FC236}">
+                <a16:creationId xmlns:a16="http://schemas.microsoft.com/office/drawing/2014/main" id="{8AE0937D-428B-485C-859B-C762DC074D6E}"/>
+              </a:ext>
+            </a:extLst>
+          </p:cNvPr>
+          <p:cNvPicPr/>
+          <p:nvPr/>
+        </p:nvPicPr>
+        <p:blipFill>
+          <a:blip r:embed="rId4">
+            <a:extLst>
+              <a:ext uri="{28A0092B-C50C-407E-A947-70E740481C1C}">
+                <a14:useLocalDpi xmlns:a14="http://schemas.microsoft.com/office/drawing/2010/main" val="0"/>
+              </a:ext>
+            </a:extLst>
+          </a:blip>
+          <a:stretch>
+            <a:fillRect/>
+          </a:stretch>
+        </p:blipFill>
+        <p:spPr bwMode="auto">
+          <a:xfrm>
+            <a:off x="7938502" y="1403090"/>
+            <a:ext cx="3041534" cy="2079815"/>
+          </a:xfrm>
+          <a:prstGeom prst="rect">
+            <a:avLst/>
+          </a:prstGeom>
+          <a:noFill/>
+        </p:spPr>
+      </p:pic>
+      <p:sp>
+        <p:nvSpPr>
+          <p:cNvPr id="7" name="TextBox 6">
+            <a:extLst>
+              <a:ext uri="{FF2B5EF4-FFF2-40B4-BE49-F238E27FC236}">
+                <a16:creationId xmlns:a16="http://schemas.microsoft.com/office/drawing/2014/main" id="{F6A01026-78FA-4206-BD17-77F1D05EBF0B}"/>
+              </a:ext>
+            </a:extLst>
+          </p:cNvPr>
+          <p:cNvSpPr txBox="1"/>
+          <p:nvPr/>
+        </p:nvSpPr>
+        <p:spPr>
+          <a:xfrm>
+            <a:off x="5433084" y="495009"/>
+            <a:ext cx="4674637" cy="369332"/>
+          </a:xfrm>
+          <a:prstGeom prst="rect">
+            <a:avLst/>
+          </a:prstGeom>
+          <a:noFill/>
+        </p:spPr>
+        <p:txBody>
+          <a:bodyPr wrap="square" rtlCol="0">
+            <a:spAutoFit/>
+          </a:bodyPr>
           <a:lstStyle/>
           <a:p>
-            <a:endParaRPr lang="en-US"/>
+            <a:r>
+              <a:rPr lang="en-US" dirty="0"/>
+              <a:t>85% acc training, 61% acc test</a:t>
+            </a:r>
           </a:p>
         </p:txBody>
       </p:sp>
@@ -5939,86 +8597,6 @@
     <p:extLst>
       <p:ext uri="{BB962C8B-B14F-4D97-AF65-F5344CB8AC3E}">
         <p14:creationId xmlns:p14="http://schemas.microsoft.com/office/powerpoint/2010/main" val="4187390946"/>
-      </p:ext>
-    </p:extLst>
-  </p:cSld>
-  <p:clrMapOvr>
-    <a:masterClrMapping/>
-  </p:clrMapOvr>
-</p:sld>
-</file>
-
-<file path=ppt/slides/slide9.xml><?xml version="1.0" encoding="utf-8"?>
-<p:sld xmlns:a="http://schemas.openxmlformats.org/drawingml/2006/main" xmlns:r="http://schemas.openxmlformats.org/officeDocument/2006/relationships" xmlns:p="http://schemas.openxmlformats.org/presentationml/2006/main">
-  <p:cSld>
-    <p:spTree>
-      <p:nvGrpSpPr>
-        <p:cNvPr id="1" name=""/>
-        <p:cNvGrpSpPr/>
-        <p:nvPr/>
-      </p:nvGrpSpPr>
-      <p:grpSpPr>
-        <a:xfrm>
-          <a:off x="0" y="0"/>
-          <a:ext cx="0" cy="0"/>
-          <a:chOff x="0" y="0"/>
-          <a:chExt cx="0" cy="0"/>
-        </a:xfrm>
-      </p:grpSpPr>
-      <p:sp>
-        <p:nvSpPr>
-          <p:cNvPr id="2" name="Title 1">
-            <a:extLst>
-              <a:ext uri="{FF2B5EF4-FFF2-40B4-BE49-F238E27FC236}">
-                <a16:creationId xmlns:a16="http://schemas.microsoft.com/office/drawing/2014/main" id="{51DD6CD6-8828-4090-9D1E-A437A6E3F4B2}"/>
-              </a:ext>
-            </a:extLst>
-          </p:cNvPr>
-          <p:cNvSpPr>
-            <a:spLocks noGrp="1"/>
-          </p:cNvSpPr>
-          <p:nvPr>
-            <p:ph type="title"/>
-          </p:nvPr>
-        </p:nvSpPr>
-        <p:spPr/>
-        <p:txBody>
-          <a:bodyPr/>
-          <a:lstStyle/>
-          <a:p>
-            <a:endParaRPr lang="en-US"/>
-          </a:p>
-        </p:txBody>
-      </p:sp>
-      <p:sp>
-        <p:nvSpPr>
-          <p:cNvPr id="3" name="Content Placeholder 2">
-            <a:extLst>
-              <a:ext uri="{FF2B5EF4-FFF2-40B4-BE49-F238E27FC236}">
-                <a16:creationId xmlns:a16="http://schemas.microsoft.com/office/drawing/2014/main" id="{07D509DF-DB4F-4400-B62C-B8E37DB2A2B5}"/>
-              </a:ext>
-            </a:extLst>
-          </p:cNvPr>
-          <p:cNvSpPr>
-            <a:spLocks noGrp="1"/>
-          </p:cNvSpPr>
-          <p:nvPr>
-            <p:ph idx="1"/>
-          </p:nvPr>
-        </p:nvSpPr>
-        <p:spPr/>
-        <p:txBody>
-          <a:bodyPr/>
-          <a:lstStyle/>
-          <a:p>
-            <a:endParaRPr lang="en-US"/>
-          </a:p>
-        </p:txBody>
-      </p:sp>
-    </p:spTree>
-    <p:extLst>
-      <p:ext uri="{BB962C8B-B14F-4D97-AF65-F5344CB8AC3E}">
-        <p14:creationId xmlns:p14="http://schemas.microsoft.com/office/powerpoint/2010/main" val="2452270597"/>
       </p:ext>
     </p:extLst>
   </p:cSld>

</xml_diff>